<commit_message>
Updates to figures and tables
</commit_message>
<xml_diff>
--- a/figures/Figure1_PanelMaps_Arrange.pptx
+++ b/figures/Figure1_PanelMaps_Arrange.pptx
@@ -2,12 +2,12 @@
 <file path=ppt/presentation.xml><?xml version="1.0" encoding="utf-8"?>
 <p:presentation xmlns:a="http://schemas.openxmlformats.org/drawingml/2006/main" xmlns:r="http://schemas.openxmlformats.org/officeDocument/2006/relationships" xmlns:p="http://schemas.openxmlformats.org/presentationml/2006/main" saveSubsetFonts="1" autoCompressPictures="0">
   <p:sldMasterIdLst>
-    <p:sldMasterId id="2147483672" r:id="rId1"/>
+    <p:sldMasterId id="2147483696" r:id="rId1"/>
   </p:sldMasterIdLst>
   <p:sldIdLst>
     <p:sldId id="256" r:id="rId2"/>
   </p:sldIdLst>
-  <p:sldSz cx="6858000" cy="7315200"/>
+  <p:sldSz cx="5943600" cy="7315200"/>
   <p:notesSz cx="6858000" cy="9144000"/>
   <p:defaultTextStyle>
     <a:defPPr>
@@ -104,7 +104,872 @@
       </a:defRPr>
     </a:lvl9pPr>
   </p:defaultTextStyle>
+  <p:extLst>
+    <p:ext uri="{EFAFB233-063F-42B5-8137-9DF3F51BA10A}">
+      <p15:sldGuideLst xmlns:p15="http://schemas.microsoft.com/office/powerpoint/2012/main">
+        <p15:guide id="1" orient="horz" pos="3864" userDrawn="1">
+          <p15:clr>
+            <a:srgbClr val="A4A3A4"/>
+          </p15:clr>
+        </p15:guide>
+        <p15:guide id="2" pos="1872" userDrawn="1">
+          <p15:clr>
+            <a:srgbClr val="A4A3A4"/>
+          </p15:clr>
+        </p15:guide>
+      </p15:sldGuideLst>
+    </p:ext>
+  </p:extLst>
 </p:presentation>
+</file>
+
+<file path=ppt/revisionInfo.xml><?xml version="1.0" encoding="utf-8"?>
+<p1510:revInfo xmlns:a="http://schemas.openxmlformats.org/drawingml/2006/main" xmlns:r="http://schemas.openxmlformats.org/officeDocument/2006/relationships" xmlns:p1510="http://schemas.microsoft.com/office/powerpoint/2015/10/main">
+  <p1510:revLst>
+    <p1510:client id="{5064C11E-9D4E-8941-A2BE-AE2A4CD31B41}" v="28" dt="2023-08-30T22:51:22.365"/>
+  </p1510:revLst>
+</p1510:revInfo>
+</file>
+
+<file path=ppt/changesInfos/changesInfo1.xml><?xml version="1.0" encoding="utf-8"?>
+<pc:chgInfo xmlns:a="http://schemas.openxmlformats.org/drawingml/2006/main" xmlns:r="http://schemas.openxmlformats.org/officeDocument/2006/relationships" xmlns:ac="http://schemas.microsoft.com/office/drawing/2013/main/command" xmlns:pc="http://schemas.microsoft.com/office/powerpoint/2013/main/command">
+  <pc:docChgLst>
+    <pc:chgData name="Maxwell Cook" userId="6270a8f4b8f62cae" providerId="LiveId" clId="{5064C11E-9D4E-8941-A2BE-AE2A4CD31B41}"/>
+    <pc:docChg chg="undo custSel modSld modMainMaster">
+      <pc:chgData name="Maxwell Cook" userId="6270a8f4b8f62cae" providerId="LiveId" clId="{5064C11E-9D4E-8941-A2BE-AE2A4CD31B41}" dt="2023-08-30T22:51:22.365" v="285" actId="164"/>
+      <pc:docMkLst>
+        <pc:docMk/>
+      </pc:docMkLst>
+      <pc:sldChg chg="addSp delSp modSp mod">
+        <pc:chgData name="Maxwell Cook" userId="6270a8f4b8f62cae" providerId="LiveId" clId="{5064C11E-9D4E-8941-A2BE-AE2A4CD31B41}" dt="2023-08-30T22:51:22.365" v="285" actId="164"/>
+        <pc:sldMkLst>
+          <pc:docMk/>
+          <pc:sldMk cId="2170444034" sldId="256"/>
+        </pc:sldMkLst>
+        <pc:spChg chg="add mod">
+          <ac:chgData name="Maxwell Cook" userId="6270a8f4b8f62cae" providerId="LiveId" clId="{5064C11E-9D4E-8941-A2BE-AE2A4CD31B41}" dt="2023-08-30T17:23:08.621" v="273" actId="164"/>
+          <ac:spMkLst>
+            <pc:docMk/>
+            <pc:sldMk cId="2170444034" sldId="256"/>
+            <ac:spMk id="4" creationId="{ADC42F44-5573-2ED6-4D34-A1389B41BAFD}"/>
+          </ac:spMkLst>
+        </pc:spChg>
+        <pc:spChg chg="add mod">
+          <ac:chgData name="Maxwell Cook" userId="6270a8f4b8f62cae" providerId="LiveId" clId="{5064C11E-9D4E-8941-A2BE-AE2A4CD31B41}" dt="2023-08-30T17:23:08.621" v="273" actId="164"/>
+          <ac:spMkLst>
+            <pc:docMk/>
+            <pc:sldMk cId="2170444034" sldId="256"/>
+            <ac:spMk id="6" creationId="{172DA89F-0CA6-171A-F5BC-EC15A3237041}"/>
+          </ac:spMkLst>
+        </pc:spChg>
+        <pc:spChg chg="add mod">
+          <ac:chgData name="Maxwell Cook" userId="6270a8f4b8f62cae" providerId="LiveId" clId="{5064C11E-9D4E-8941-A2BE-AE2A4CD31B41}" dt="2023-08-30T17:23:08.621" v="273" actId="164"/>
+          <ac:spMkLst>
+            <pc:docMk/>
+            <pc:sldMk cId="2170444034" sldId="256"/>
+            <ac:spMk id="7" creationId="{98C125B5-A1AF-C6E1-2E50-18C860451843}"/>
+          </ac:spMkLst>
+        </pc:spChg>
+        <pc:spChg chg="add mod">
+          <ac:chgData name="Maxwell Cook" userId="6270a8f4b8f62cae" providerId="LiveId" clId="{5064C11E-9D4E-8941-A2BE-AE2A4CD31B41}" dt="2023-08-30T17:23:08.621" v="273" actId="164"/>
+          <ac:spMkLst>
+            <pc:docMk/>
+            <pc:sldMk cId="2170444034" sldId="256"/>
+            <ac:spMk id="8" creationId="{D84F4EF2-0EA1-14E6-4667-FB851AEDF9E8}"/>
+          </ac:spMkLst>
+        </pc:spChg>
+        <pc:spChg chg="add mod">
+          <ac:chgData name="Maxwell Cook" userId="6270a8f4b8f62cae" providerId="LiveId" clId="{5064C11E-9D4E-8941-A2BE-AE2A4CD31B41}" dt="2023-08-30T17:23:08.621" v="273" actId="164"/>
+          <ac:spMkLst>
+            <pc:docMk/>
+            <pc:sldMk cId="2170444034" sldId="256"/>
+            <ac:spMk id="9" creationId="{47AAA2C0-65FB-8C39-B8D8-9691E5F0CB02}"/>
+          </ac:spMkLst>
+        </pc:spChg>
+        <pc:spChg chg="add mod">
+          <ac:chgData name="Maxwell Cook" userId="6270a8f4b8f62cae" providerId="LiveId" clId="{5064C11E-9D4E-8941-A2BE-AE2A4CD31B41}" dt="2023-08-30T17:23:08.621" v="273" actId="164"/>
+          <ac:spMkLst>
+            <pc:docMk/>
+            <pc:sldMk cId="2170444034" sldId="256"/>
+            <ac:spMk id="10" creationId="{413D147E-D9B5-61F9-3F25-03A300601330}"/>
+          </ac:spMkLst>
+        </pc:spChg>
+        <pc:spChg chg="add mod">
+          <ac:chgData name="Maxwell Cook" userId="6270a8f4b8f62cae" providerId="LiveId" clId="{5064C11E-9D4E-8941-A2BE-AE2A4CD31B41}" dt="2023-08-30T17:23:08.621" v="273" actId="164"/>
+          <ac:spMkLst>
+            <pc:docMk/>
+            <pc:sldMk cId="2170444034" sldId="256"/>
+            <ac:spMk id="12" creationId="{5D5D6216-993E-C5B7-13E4-C96EE9587A7C}"/>
+          </ac:spMkLst>
+        </pc:spChg>
+        <pc:spChg chg="add mod topLvl">
+          <ac:chgData name="Maxwell Cook" userId="6270a8f4b8f62cae" providerId="LiveId" clId="{5064C11E-9D4E-8941-A2BE-AE2A4CD31B41}" dt="2023-08-30T17:17:39.406" v="209" actId="164"/>
+          <ac:spMkLst>
+            <pc:docMk/>
+            <pc:sldMk cId="2170444034" sldId="256"/>
+            <ac:spMk id="20" creationId="{8E1F1EAB-3406-CF4B-79EF-47B1942CED47}"/>
+          </ac:spMkLst>
+        </pc:spChg>
+        <pc:spChg chg="add mod topLvl">
+          <ac:chgData name="Maxwell Cook" userId="6270a8f4b8f62cae" providerId="LiveId" clId="{5064C11E-9D4E-8941-A2BE-AE2A4CD31B41}" dt="2023-08-30T17:17:39.406" v="209" actId="164"/>
+          <ac:spMkLst>
+            <pc:docMk/>
+            <pc:sldMk cId="2170444034" sldId="256"/>
+            <ac:spMk id="21" creationId="{EDE9353A-DB6D-405A-EAB9-ADCB782DD9F9}"/>
+          </ac:spMkLst>
+        </pc:spChg>
+        <pc:spChg chg="add del mod">
+          <ac:chgData name="Maxwell Cook" userId="6270a8f4b8f62cae" providerId="LiveId" clId="{5064C11E-9D4E-8941-A2BE-AE2A4CD31B41}" dt="2023-08-30T17:16:11.212" v="203" actId="767"/>
+          <ac:spMkLst>
+            <pc:docMk/>
+            <pc:sldMk cId="2170444034" sldId="256"/>
+            <ac:spMk id="23" creationId="{64881E3D-86D7-359F-6F4F-68375F85C99C}"/>
+          </ac:spMkLst>
+        </pc:spChg>
+        <pc:spChg chg="mod topLvl">
+          <ac:chgData name="Maxwell Cook" userId="6270a8f4b8f62cae" providerId="LiveId" clId="{5064C11E-9D4E-8941-A2BE-AE2A4CD31B41}" dt="2023-08-30T17:20:39.631" v="237" actId="164"/>
+          <ac:spMkLst>
+            <pc:docMk/>
+            <pc:sldMk cId="2170444034" sldId="256"/>
+            <ac:spMk id="29" creationId="{2A8429D0-769E-9AC0-A68C-49C2DBF10383}"/>
+          </ac:spMkLst>
+        </pc:spChg>
+        <pc:spChg chg="mod topLvl">
+          <ac:chgData name="Maxwell Cook" userId="6270a8f4b8f62cae" providerId="LiveId" clId="{5064C11E-9D4E-8941-A2BE-AE2A4CD31B41}" dt="2023-08-30T17:20:39.631" v="237" actId="164"/>
+          <ac:spMkLst>
+            <pc:docMk/>
+            <pc:sldMk cId="2170444034" sldId="256"/>
+            <ac:spMk id="30" creationId="{14372BC4-84D9-8E52-1E1D-B3CF8846D71F}"/>
+          </ac:spMkLst>
+        </pc:spChg>
+        <pc:spChg chg="mod topLvl">
+          <ac:chgData name="Maxwell Cook" userId="6270a8f4b8f62cae" providerId="LiveId" clId="{5064C11E-9D4E-8941-A2BE-AE2A4CD31B41}" dt="2023-08-30T17:23:08.621" v="273" actId="164"/>
+          <ac:spMkLst>
+            <pc:docMk/>
+            <pc:sldMk cId="2170444034" sldId="256"/>
+            <ac:spMk id="36" creationId="{E5004386-CD0B-2A44-4818-D29DD5F693B4}"/>
+          </ac:spMkLst>
+        </pc:spChg>
+        <pc:spChg chg="mod topLvl">
+          <ac:chgData name="Maxwell Cook" userId="6270a8f4b8f62cae" providerId="LiveId" clId="{5064C11E-9D4E-8941-A2BE-AE2A4CD31B41}" dt="2023-08-30T17:23:08.621" v="273" actId="164"/>
+          <ac:spMkLst>
+            <pc:docMk/>
+            <pc:sldMk cId="2170444034" sldId="256"/>
+            <ac:spMk id="37" creationId="{4CF4CC54-8B09-8C34-1A7A-B2528D5BAA05}"/>
+          </ac:spMkLst>
+        </pc:spChg>
+        <pc:grpChg chg="del mod topLvl">
+          <ac:chgData name="Maxwell Cook" userId="6270a8f4b8f62cae" providerId="LiveId" clId="{5064C11E-9D4E-8941-A2BE-AE2A4CD31B41}" dt="2023-08-30T17:17:18.685" v="208" actId="165"/>
+          <ac:grpSpMkLst>
+            <pc:docMk/>
+            <pc:sldMk cId="2170444034" sldId="256"/>
+            <ac:grpSpMk id="24" creationId="{B3F1F6C3-5606-F2A7-FB87-B4F7C4541FB0}"/>
+          </ac:grpSpMkLst>
+        </pc:grpChg>
+        <pc:grpChg chg="add del mod">
+          <ac:chgData name="Maxwell Cook" userId="6270a8f4b8f62cae" providerId="LiveId" clId="{5064C11E-9D4E-8941-A2BE-AE2A4CD31B41}" dt="2023-08-30T17:17:12.385" v="207" actId="165"/>
+          <ac:grpSpMkLst>
+            <pc:docMk/>
+            <pc:sldMk cId="2170444034" sldId="256"/>
+            <ac:grpSpMk id="25" creationId="{0AF5A6AA-4E2A-D7E4-9349-0454AECBDAEE}"/>
+          </ac:grpSpMkLst>
+        </pc:grpChg>
+        <pc:grpChg chg="add mod">
+          <ac:chgData name="Maxwell Cook" userId="6270a8f4b8f62cae" providerId="LiveId" clId="{5064C11E-9D4E-8941-A2BE-AE2A4CD31B41}" dt="2023-08-30T17:23:08.621" v="273" actId="164"/>
+          <ac:grpSpMkLst>
+            <pc:docMk/>
+            <pc:sldMk cId="2170444034" sldId="256"/>
+            <ac:grpSpMk id="26" creationId="{288BEA6A-6616-7160-DE7E-E83EE333CF42}"/>
+          </ac:grpSpMkLst>
+        </pc:grpChg>
+        <pc:grpChg chg="add del mod">
+          <ac:chgData name="Maxwell Cook" userId="6270a8f4b8f62cae" providerId="LiveId" clId="{5064C11E-9D4E-8941-A2BE-AE2A4CD31B41}" dt="2023-08-30T17:20:26.844" v="235" actId="165"/>
+          <ac:grpSpMkLst>
+            <pc:docMk/>
+            <pc:sldMk cId="2170444034" sldId="256"/>
+            <ac:grpSpMk id="27" creationId="{24C89F51-4C34-782E-6395-1F0841959F3A}"/>
+          </ac:grpSpMkLst>
+        </pc:grpChg>
+        <pc:grpChg chg="add mod">
+          <ac:chgData name="Maxwell Cook" userId="6270a8f4b8f62cae" providerId="LiveId" clId="{5064C11E-9D4E-8941-A2BE-AE2A4CD31B41}" dt="2023-08-30T17:23:08.621" v="273" actId="164"/>
+          <ac:grpSpMkLst>
+            <pc:docMk/>
+            <pc:sldMk cId="2170444034" sldId="256"/>
+            <ac:grpSpMk id="33" creationId="{3C6082F4-2EBA-36BB-A899-7A2102587A79}"/>
+          </ac:grpSpMkLst>
+        </pc:grpChg>
+        <pc:grpChg chg="add del mod">
+          <ac:chgData name="Maxwell Cook" userId="6270a8f4b8f62cae" providerId="LiveId" clId="{5064C11E-9D4E-8941-A2BE-AE2A4CD31B41}" dt="2023-08-30T17:22:03.960" v="265" actId="165"/>
+          <ac:grpSpMkLst>
+            <pc:docMk/>
+            <pc:sldMk cId="2170444034" sldId="256"/>
+            <ac:grpSpMk id="34" creationId="{FE2561C9-BADA-E5D6-587B-4DABC20E97A1}"/>
+          </ac:grpSpMkLst>
+        </pc:grpChg>
+        <pc:grpChg chg="add mod">
+          <ac:chgData name="Maxwell Cook" userId="6270a8f4b8f62cae" providerId="LiveId" clId="{5064C11E-9D4E-8941-A2BE-AE2A4CD31B41}" dt="2023-08-30T22:51:22.365" v="285" actId="164"/>
+          <ac:grpSpMkLst>
+            <pc:docMk/>
+            <pc:sldMk cId="2170444034" sldId="256"/>
+            <ac:grpSpMk id="42" creationId="{5979B789-1E96-9961-CB66-BBD9DF84B2F3}"/>
+          </ac:grpSpMkLst>
+        </pc:grpChg>
+        <pc:grpChg chg="add mod">
+          <ac:chgData name="Maxwell Cook" userId="6270a8f4b8f62cae" providerId="LiveId" clId="{5064C11E-9D4E-8941-A2BE-AE2A4CD31B41}" dt="2023-08-30T22:51:22.365" v="285" actId="164"/>
+          <ac:grpSpMkLst>
+            <pc:docMk/>
+            <pc:sldMk cId="2170444034" sldId="256"/>
+            <ac:grpSpMk id="45" creationId="{41C23E74-FDF0-2B40-43FB-3811CB15C600}"/>
+          </ac:grpSpMkLst>
+        </pc:grpChg>
+        <pc:picChg chg="add del mod">
+          <ac:chgData name="Maxwell Cook" userId="6270a8f4b8f62cae" providerId="LiveId" clId="{5064C11E-9D4E-8941-A2BE-AE2A4CD31B41}" dt="2023-08-30T17:09:10.754" v="154" actId="478"/>
+          <ac:picMkLst>
+            <pc:docMk/>
+            <pc:sldMk cId="2170444034" sldId="256"/>
+            <ac:picMk id="3" creationId="{95FB1B54-8B92-B4D9-645D-67F4D6F32628}"/>
+          </ac:picMkLst>
+        </pc:picChg>
+        <pc:picChg chg="mod topLvl">
+          <ac:chgData name="Maxwell Cook" userId="6270a8f4b8f62cae" providerId="LiveId" clId="{5064C11E-9D4E-8941-A2BE-AE2A4CD31B41}" dt="2023-08-30T17:23:08.621" v="273" actId="164"/>
+          <ac:picMkLst>
+            <pc:docMk/>
+            <pc:sldMk cId="2170444034" sldId="256"/>
+            <ac:picMk id="5" creationId="{39E164EF-881E-0794-1307-6EEFF0FFBAB1}"/>
+          </ac:picMkLst>
+        </pc:picChg>
+        <pc:picChg chg="mod topLvl">
+          <ac:chgData name="Maxwell Cook" userId="6270a8f4b8f62cae" providerId="LiveId" clId="{5064C11E-9D4E-8941-A2BE-AE2A4CD31B41}" dt="2023-08-30T17:23:08.621" v="273" actId="164"/>
+          <ac:picMkLst>
+            <pc:docMk/>
+            <pc:sldMk cId="2170444034" sldId="256"/>
+            <ac:picMk id="11" creationId="{37BF7B02-6A9A-7447-AB4F-6F4460D8DE07}"/>
+          </ac:picMkLst>
+        </pc:picChg>
+        <pc:picChg chg="mod topLvl">
+          <ac:chgData name="Maxwell Cook" userId="6270a8f4b8f62cae" providerId="LiveId" clId="{5064C11E-9D4E-8941-A2BE-AE2A4CD31B41}" dt="2023-08-30T17:23:08.621" v="273" actId="164"/>
+          <ac:picMkLst>
+            <pc:docMk/>
+            <pc:sldMk cId="2170444034" sldId="256"/>
+            <ac:picMk id="13" creationId="{042CB577-A4A4-7E38-9B36-16C8B17C4964}"/>
+          </ac:picMkLst>
+        </pc:picChg>
+        <pc:picChg chg="mod topLvl">
+          <ac:chgData name="Maxwell Cook" userId="6270a8f4b8f62cae" providerId="LiveId" clId="{5064C11E-9D4E-8941-A2BE-AE2A4CD31B41}" dt="2023-08-30T17:23:08.621" v="273" actId="164"/>
+          <ac:picMkLst>
+            <pc:docMk/>
+            <pc:sldMk cId="2170444034" sldId="256"/>
+            <ac:picMk id="15" creationId="{775DFF09-BC18-589D-94A6-B7E2AFE91C8F}"/>
+          </ac:picMkLst>
+        </pc:picChg>
+        <pc:picChg chg="add mod">
+          <ac:chgData name="Maxwell Cook" userId="6270a8f4b8f62cae" providerId="LiveId" clId="{5064C11E-9D4E-8941-A2BE-AE2A4CD31B41}" dt="2023-08-30T17:23:08.621" v="273" actId="164"/>
+          <ac:picMkLst>
+            <pc:docMk/>
+            <pc:sldMk cId="2170444034" sldId="256"/>
+            <ac:picMk id="16" creationId="{42C9D3E6-33CC-F32E-2BE6-EA36E3C9667D}"/>
+          </ac:picMkLst>
+        </pc:picChg>
+        <pc:picChg chg="mod topLvl">
+          <ac:chgData name="Maxwell Cook" userId="6270a8f4b8f62cae" providerId="LiveId" clId="{5064C11E-9D4E-8941-A2BE-AE2A4CD31B41}" dt="2023-08-30T17:23:08.621" v="273" actId="164"/>
+          <ac:picMkLst>
+            <pc:docMk/>
+            <pc:sldMk cId="2170444034" sldId="256"/>
+            <ac:picMk id="19" creationId="{5191C38E-221D-CF1D-AF7A-9E7CD8E0E473}"/>
+          </ac:picMkLst>
+        </pc:picChg>
+        <pc:picChg chg="del mod topLvl">
+          <ac:chgData name="Maxwell Cook" userId="6270a8f4b8f62cae" providerId="LiveId" clId="{5064C11E-9D4E-8941-A2BE-AE2A4CD31B41}" dt="2023-08-30T22:50:38.860" v="279" actId="478"/>
+          <ac:picMkLst>
+            <pc:docMk/>
+            <pc:sldMk cId="2170444034" sldId="256"/>
+            <ac:picMk id="22" creationId="{E2BBE999-9A8C-E3E5-EE6D-08A81B7ECDBA}"/>
+          </ac:picMkLst>
+        </pc:picChg>
+        <pc:picChg chg="add mod">
+          <ac:chgData name="Maxwell Cook" userId="6270a8f4b8f62cae" providerId="LiveId" clId="{5064C11E-9D4E-8941-A2BE-AE2A4CD31B41}" dt="2023-08-30T22:51:22.365" v="285" actId="164"/>
+          <ac:picMkLst>
+            <pc:docMk/>
+            <pc:sldMk cId="2170444034" sldId="256"/>
+            <ac:picMk id="44" creationId="{0656A5FB-22E0-B700-6170-56C48F6B7964}"/>
+          </ac:picMkLst>
+        </pc:picChg>
+        <pc:cxnChg chg="add mod topLvl">
+          <ac:chgData name="Maxwell Cook" userId="6270a8f4b8f62cae" providerId="LiveId" clId="{5064C11E-9D4E-8941-A2BE-AE2A4CD31B41}" dt="2023-08-30T17:17:39.406" v="209" actId="164"/>
+          <ac:cxnSpMkLst>
+            <pc:docMk/>
+            <pc:sldMk cId="2170444034" sldId="256"/>
+            <ac:cxnSpMk id="18" creationId="{FB0BCBDA-D990-B1FE-8068-D156F677FA80}"/>
+          </ac:cxnSpMkLst>
+        </pc:cxnChg>
+        <pc:cxnChg chg="mod topLvl">
+          <ac:chgData name="Maxwell Cook" userId="6270a8f4b8f62cae" providerId="LiveId" clId="{5064C11E-9D4E-8941-A2BE-AE2A4CD31B41}" dt="2023-08-30T17:20:39.631" v="237" actId="164"/>
+          <ac:cxnSpMkLst>
+            <pc:docMk/>
+            <pc:sldMk cId="2170444034" sldId="256"/>
+            <ac:cxnSpMk id="28" creationId="{D03DDD88-5847-AAC6-DED8-F8A6C796AF61}"/>
+          </ac:cxnSpMkLst>
+        </pc:cxnChg>
+        <pc:cxnChg chg="mod topLvl">
+          <ac:chgData name="Maxwell Cook" userId="6270a8f4b8f62cae" providerId="LiveId" clId="{5064C11E-9D4E-8941-A2BE-AE2A4CD31B41}" dt="2023-08-30T17:23:08.621" v="273" actId="164"/>
+          <ac:cxnSpMkLst>
+            <pc:docMk/>
+            <pc:sldMk cId="2170444034" sldId="256"/>
+            <ac:cxnSpMk id="35" creationId="{44AC5393-F568-C12C-412A-5C49BF15DEED}"/>
+          </ac:cxnSpMkLst>
+        </pc:cxnChg>
+      </pc:sldChg>
+      <pc:sldMasterChg chg="modSp modSldLayout">
+        <pc:chgData name="Maxwell Cook" userId="6270a8f4b8f62cae" providerId="LiveId" clId="{5064C11E-9D4E-8941-A2BE-AE2A4CD31B41}" dt="2023-08-30T16:58:00.670" v="15"/>
+        <pc:sldMasterMkLst>
+          <pc:docMk/>
+          <pc:sldMasterMk cId="3937815069" sldId="2147483672"/>
+        </pc:sldMasterMkLst>
+        <pc:spChg chg="mod">
+          <ac:chgData name="Maxwell Cook" userId="6270a8f4b8f62cae" providerId="LiveId" clId="{5064C11E-9D4E-8941-A2BE-AE2A4CD31B41}" dt="2023-08-30T16:58:00.670" v="15"/>
+          <ac:spMkLst>
+            <pc:docMk/>
+            <pc:sldMasterMk cId="3937815069" sldId="2147483672"/>
+            <ac:spMk id="2" creationId="{00000000-0000-0000-0000-000000000000}"/>
+          </ac:spMkLst>
+        </pc:spChg>
+        <pc:spChg chg="mod">
+          <ac:chgData name="Maxwell Cook" userId="6270a8f4b8f62cae" providerId="LiveId" clId="{5064C11E-9D4E-8941-A2BE-AE2A4CD31B41}" dt="2023-08-30T16:58:00.670" v="15"/>
+          <ac:spMkLst>
+            <pc:docMk/>
+            <pc:sldMasterMk cId="3937815069" sldId="2147483672"/>
+            <ac:spMk id="3" creationId="{00000000-0000-0000-0000-000000000000}"/>
+          </ac:spMkLst>
+        </pc:spChg>
+        <pc:spChg chg="mod">
+          <ac:chgData name="Maxwell Cook" userId="6270a8f4b8f62cae" providerId="LiveId" clId="{5064C11E-9D4E-8941-A2BE-AE2A4CD31B41}" dt="2023-08-30T16:58:00.670" v="15"/>
+          <ac:spMkLst>
+            <pc:docMk/>
+            <pc:sldMasterMk cId="3937815069" sldId="2147483672"/>
+            <ac:spMk id="4" creationId="{00000000-0000-0000-0000-000000000000}"/>
+          </ac:spMkLst>
+        </pc:spChg>
+        <pc:spChg chg="mod">
+          <ac:chgData name="Maxwell Cook" userId="6270a8f4b8f62cae" providerId="LiveId" clId="{5064C11E-9D4E-8941-A2BE-AE2A4CD31B41}" dt="2023-08-30T16:58:00.670" v="15"/>
+          <ac:spMkLst>
+            <pc:docMk/>
+            <pc:sldMasterMk cId="3937815069" sldId="2147483672"/>
+            <ac:spMk id="5" creationId="{00000000-0000-0000-0000-000000000000}"/>
+          </ac:spMkLst>
+        </pc:spChg>
+        <pc:spChg chg="mod">
+          <ac:chgData name="Maxwell Cook" userId="6270a8f4b8f62cae" providerId="LiveId" clId="{5064C11E-9D4E-8941-A2BE-AE2A4CD31B41}" dt="2023-08-30T16:58:00.670" v="15"/>
+          <ac:spMkLst>
+            <pc:docMk/>
+            <pc:sldMasterMk cId="3937815069" sldId="2147483672"/>
+            <ac:spMk id="6" creationId="{00000000-0000-0000-0000-000000000000}"/>
+          </ac:spMkLst>
+        </pc:spChg>
+        <pc:sldLayoutChg chg="modSp">
+          <pc:chgData name="Maxwell Cook" userId="6270a8f4b8f62cae" providerId="LiveId" clId="{5064C11E-9D4E-8941-A2BE-AE2A4CD31B41}" dt="2023-08-30T16:58:00.670" v="15"/>
+          <pc:sldLayoutMkLst>
+            <pc:docMk/>
+            <pc:sldMasterMk cId="3937815069" sldId="2147483672"/>
+            <pc:sldLayoutMk cId="2253946723" sldId="2147483673"/>
+          </pc:sldLayoutMkLst>
+          <pc:spChg chg="mod">
+            <ac:chgData name="Maxwell Cook" userId="6270a8f4b8f62cae" providerId="LiveId" clId="{5064C11E-9D4E-8941-A2BE-AE2A4CD31B41}" dt="2023-08-30T16:58:00.670" v="15"/>
+            <ac:spMkLst>
+              <pc:docMk/>
+              <pc:sldMasterMk cId="3937815069" sldId="2147483672"/>
+              <pc:sldLayoutMk cId="2253946723" sldId="2147483673"/>
+              <ac:spMk id="2" creationId="{00000000-0000-0000-0000-000000000000}"/>
+            </ac:spMkLst>
+          </pc:spChg>
+          <pc:spChg chg="mod">
+            <ac:chgData name="Maxwell Cook" userId="6270a8f4b8f62cae" providerId="LiveId" clId="{5064C11E-9D4E-8941-A2BE-AE2A4CD31B41}" dt="2023-08-30T16:58:00.670" v="15"/>
+            <ac:spMkLst>
+              <pc:docMk/>
+              <pc:sldMasterMk cId="3937815069" sldId="2147483672"/>
+              <pc:sldLayoutMk cId="2253946723" sldId="2147483673"/>
+              <ac:spMk id="3" creationId="{00000000-0000-0000-0000-000000000000}"/>
+            </ac:spMkLst>
+          </pc:spChg>
+        </pc:sldLayoutChg>
+        <pc:sldLayoutChg chg="modSp">
+          <pc:chgData name="Maxwell Cook" userId="6270a8f4b8f62cae" providerId="LiveId" clId="{5064C11E-9D4E-8941-A2BE-AE2A4CD31B41}" dt="2023-08-30T16:58:00.670" v="15"/>
+          <pc:sldLayoutMkLst>
+            <pc:docMk/>
+            <pc:sldMasterMk cId="3937815069" sldId="2147483672"/>
+            <pc:sldLayoutMk cId="2724168220" sldId="2147483675"/>
+          </pc:sldLayoutMkLst>
+          <pc:spChg chg="mod">
+            <ac:chgData name="Maxwell Cook" userId="6270a8f4b8f62cae" providerId="LiveId" clId="{5064C11E-9D4E-8941-A2BE-AE2A4CD31B41}" dt="2023-08-30T16:58:00.670" v="15"/>
+            <ac:spMkLst>
+              <pc:docMk/>
+              <pc:sldMasterMk cId="3937815069" sldId="2147483672"/>
+              <pc:sldLayoutMk cId="2724168220" sldId="2147483675"/>
+              <ac:spMk id="2" creationId="{00000000-0000-0000-0000-000000000000}"/>
+            </ac:spMkLst>
+          </pc:spChg>
+          <pc:spChg chg="mod">
+            <ac:chgData name="Maxwell Cook" userId="6270a8f4b8f62cae" providerId="LiveId" clId="{5064C11E-9D4E-8941-A2BE-AE2A4CD31B41}" dt="2023-08-30T16:58:00.670" v="15"/>
+            <ac:spMkLst>
+              <pc:docMk/>
+              <pc:sldMasterMk cId="3937815069" sldId="2147483672"/>
+              <pc:sldLayoutMk cId="2724168220" sldId="2147483675"/>
+              <ac:spMk id="3" creationId="{00000000-0000-0000-0000-000000000000}"/>
+            </ac:spMkLst>
+          </pc:spChg>
+        </pc:sldLayoutChg>
+        <pc:sldLayoutChg chg="modSp">
+          <pc:chgData name="Maxwell Cook" userId="6270a8f4b8f62cae" providerId="LiveId" clId="{5064C11E-9D4E-8941-A2BE-AE2A4CD31B41}" dt="2023-08-30T16:58:00.670" v="15"/>
+          <pc:sldLayoutMkLst>
+            <pc:docMk/>
+            <pc:sldMasterMk cId="3937815069" sldId="2147483672"/>
+            <pc:sldLayoutMk cId="3075857211" sldId="2147483676"/>
+          </pc:sldLayoutMkLst>
+          <pc:spChg chg="mod">
+            <ac:chgData name="Maxwell Cook" userId="6270a8f4b8f62cae" providerId="LiveId" clId="{5064C11E-9D4E-8941-A2BE-AE2A4CD31B41}" dt="2023-08-30T16:58:00.670" v="15"/>
+            <ac:spMkLst>
+              <pc:docMk/>
+              <pc:sldMasterMk cId="3937815069" sldId="2147483672"/>
+              <pc:sldLayoutMk cId="3075857211" sldId="2147483676"/>
+              <ac:spMk id="3" creationId="{00000000-0000-0000-0000-000000000000}"/>
+            </ac:spMkLst>
+          </pc:spChg>
+          <pc:spChg chg="mod">
+            <ac:chgData name="Maxwell Cook" userId="6270a8f4b8f62cae" providerId="LiveId" clId="{5064C11E-9D4E-8941-A2BE-AE2A4CD31B41}" dt="2023-08-30T16:58:00.670" v="15"/>
+            <ac:spMkLst>
+              <pc:docMk/>
+              <pc:sldMasterMk cId="3937815069" sldId="2147483672"/>
+              <pc:sldLayoutMk cId="3075857211" sldId="2147483676"/>
+              <ac:spMk id="4" creationId="{00000000-0000-0000-0000-000000000000}"/>
+            </ac:spMkLst>
+          </pc:spChg>
+        </pc:sldLayoutChg>
+        <pc:sldLayoutChg chg="modSp">
+          <pc:chgData name="Maxwell Cook" userId="6270a8f4b8f62cae" providerId="LiveId" clId="{5064C11E-9D4E-8941-A2BE-AE2A4CD31B41}" dt="2023-08-30T16:58:00.670" v="15"/>
+          <pc:sldLayoutMkLst>
+            <pc:docMk/>
+            <pc:sldMasterMk cId="3937815069" sldId="2147483672"/>
+            <pc:sldLayoutMk cId="3065533319" sldId="2147483677"/>
+          </pc:sldLayoutMkLst>
+          <pc:spChg chg="mod">
+            <ac:chgData name="Maxwell Cook" userId="6270a8f4b8f62cae" providerId="LiveId" clId="{5064C11E-9D4E-8941-A2BE-AE2A4CD31B41}" dt="2023-08-30T16:58:00.670" v="15"/>
+            <ac:spMkLst>
+              <pc:docMk/>
+              <pc:sldMasterMk cId="3937815069" sldId="2147483672"/>
+              <pc:sldLayoutMk cId="3065533319" sldId="2147483677"/>
+              <ac:spMk id="2" creationId="{00000000-0000-0000-0000-000000000000}"/>
+            </ac:spMkLst>
+          </pc:spChg>
+          <pc:spChg chg="mod">
+            <ac:chgData name="Maxwell Cook" userId="6270a8f4b8f62cae" providerId="LiveId" clId="{5064C11E-9D4E-8941-A2BE-AE2A4CD31B41}" dt="2023-08-30T16:58:00.670" v="15"/>
+            <ac:spMkLst>
+              <pc:docMk/>
+              <pc:sldMasterMk cId="3937815069" sldId="2147483672"/>
+              <pc:sldLayoutMk cId="3065533319" sldId="2147483677"/>
+              <ac:spMk id="3" creationId="{00000000-0000-0000-0000-000000000000}"/>
+            </ac:spMkLst>
+          </pc:spChg>
+          <pc:spChg chg="mod">
+            <ac:chgData name="Maxwell Cook" userId="6270a8f4b8f62cae" providerId="LiveId" clId="{5064C11E-9D4E-8941-A2BE-AE2A4CD31B41}" dt="2023-08-30T16:58:00.670" v="15"/>
+            <ac:spMkLst>
+              <pc:docMk/>
+              <pc:sldMasterMk cId="3937815069" sldId="2147483672"/>
+              <pc:sldLayoutMk cId="3065533319" sldId="2147483677"/>
+              <ac:spMk id="4" creationId="{00000000-0000-0000-0000-000000000000}"/>
+            </ac:spMkLst>
+          </pc:spChg>
+          <pc:spChg chg="mod">
+            <ac:chgData name="Maxwell Cook" userId="6270a8f4b8f62cae" providerId="LiveId" clId="{5064C11E-9D4E-8941-A2BE-AE2A4CD31B41}" dt="2023-08-30T16:58:00.670" v="15"/>
+            <ac:spMkLst>
+              <pc:docMk/>
+              <pc:sldMasterMk cId="3937815069" sldId="2147483672"/>
+              <pc:sldLayoutMk cId="3065533319" sldId="2147483677"/>
+              <ac:spMk id="5" creationId="{00000000-0000-0000-0000-000000000000}"/>
+            </ac:spMkLst>
+          </pc:spChg>
+          <pc:spChg chg="mod">
+            <ac:chgData name="Maxwell Cook" userId="6270a8f4b8f62cae" providerId="LiveId" clId="{5064C11E-9D4E-8941-A2BE-AE2A4CD31B41}" dt="2023-08-30T16:58:00.670" v="15"/>
+            <ac:spMkLst>
+              <pc:docMk/>
+              <pc:sldMasterMk cId="3937815069" sldId="2147483672"/>
+              <pc:sldLayoutMk cId="3065533319" sldId="2147483677"/>
+              <ac:spMk id="6" creationId="{00000000-0000-0000-0000-000000000000}"/>
+            </ac:spMkLst>
+          </pc:spChg>
+        </pc:sldLayoutChg>
+        <pc:sldLayoutChg chg="modSp">
+          <pc:chgData name="Maxwell Cook" userId="6270a8f4b8f62cae" providerId="LiveId" clId="{5064C11E-9D4E-8941-A2BE-AE2A4CD31B41}" dt="2023-08-30T16:58:00.670" v="15"/>
+          <pc:sldLayoutMkLst>
+            <pc:docMk/>
+            <pc:sldMasterMk cId="3937815069" sldId="2147483672"/>
+            <pc:sldLayoutMk cId="2168036541" sldId="2147483680"/>
+          </pc:sldLayoutMkLst>
+          <pc:spChg chg="mod">
+            <ac:chgData name="Maxwell Cook" userId="6270a8f4b8f62cae" providerId="LiveId" clId="{5064C11E-9D4E-8941-A2BE-AE2A4CD31B41}" dt="2023-08-30T16:58:00.670" v="15"/>
+            <ac:spMkLst>
+              <pc:docMk/>
+              <pc:sldMasterMk cId="3937815069" sldId="2147483672"/>
+              <pc:sldLayoutMk cId="2168036541" sldId="2147483680"/>
+              <ac:spMk id="2" creationId="{00000000-0000-0000-0000-000000000000}"/>
+            </ac:spMkLst>
+          </pc:spChg>
+          <pc:spChg chg="mod">
+            <ac:chgData name="Maxwell Cook" userId="6270a8f4b8f62cae" providerId="LiveId" clId="{5064C11E-9D4E-8941-A2BE-AE2A4CD31B41}" dt="2023-08-30T16:58:00.670" v="15"/>
+            <ac:spMkLst>
+              <pc:docMk/>
+              <pc:sldMasterMk cId="3937815069" sldId="2147483672"/>
+              <pc:sldLayoutMk cId="2168036541" sldId="2147483680"/>
+              <ac:spMk id="3" creationId="{00000000-0000-0000-0000-000000000000}"/>
+            </ac:spMkLst>
+          </pc:spChg>
+          <pc:spChg chg="mod">
+            <ac:chgData name="Maxwell Cook" userId="6270a8f4b8f62cae" providerId="LiveId" clId="{5064C11E-9D4E-8941-A2BE-AE2A4CD31B41}" dt="2023-08-30T16:58:00.670" v="15"/>
+            <ac:spMkLst>
+              <pc:docMk/>
+              <pc:sldMasterMk cId="3937815069" sldId="2147483672"/>
+              <pc:sldLayoutMk cId="2168036541" sldId="2147483680"/>
+              <ac:spMk id="4" creationId="{00000000-0000-0000-0000-000000000000}"/>
+            </ac:spMkLst>
+          </pc:spChg>
+        </pc:sldLayoutChg>
+        <pc:sldLayoutChg chg="modSp">
+          <pc:chgData name="Maxwell Cook" userId="6270a8f4b8f62cae" providerId="LiveId" clId="{5064C11E-9D4E-8941-A2BE-AE2A4CD31B41}" dt="2023-08-30T16:58:00.670" v="15"/>
+          <pc:sldLayoutMkLst>
+            <pc:docMk/>
+            <pc:sldMasterMk cId="3937815069" sldId="2147483672"/>
+            <pc:sldLayoutMk cId="1643828127" sldId="2147483681"/>
+          </pc:sldLayoutMkLst>
+          <pc:spChg chg="mod">
+            <ac:chgData name="Maxwell Cook" userId="6270a8f4b8f62cae" providerId="LiveId" clId="{5064C11E-9D4E-8941-A2BE-AE2A4CD31B41}" dt="2023-08-30T16:58:00.670" v="15"/>
+            <ac:spMkLst>
+              <pc:docMk/>
+              <pc:sldMasterMk cId="3937815069" sldId="2147483672"/>
+              <pc:sldLayoutMk cId="1643828127" sldId="2147483681"/>
+              <ac:spMk id="2" creationId="{00000000-0000-0000-0000-000000000000}"/>
+            </ac:spMkLst>
+          </pc:spChg>
+          <pc:spChg chg="mod">
+            <ac:chgData name="Maxwell Cook" userId="6270a8f4b8f62cae" providerId="LiveId" clId="{5064C11E-9D4E-8941-A2BE-AE2A4CD31B41}" dt="2023-08-30T16:58:00.670" v="15"/>
+            <ac:spMkLst>
+              <pc:docMk/>
+              <pc:sldMasterMk cId="3937815069" sldId="2147483672"/>
+              <pc:sldLayoutMk cId="1643828127" sldId="2147483681"/>
+              <ac:spMk id="3" creationId="{00000000-0000-0000-0000-000000000000}"/>
+            </ac:spMkLst>
+          </pc:spChg>
+          <pc:spChg chg="mod">
+            <ac:chgData name="Maxwell Cook" userId="6270a8f4b8f62cae" providerId="LiveId" clId="{5064C11E-9D4E-8941-A2BE-AE2A4CD31B41}" dt="2023-08-30T16:58:00.670" v="15"/>
+            <ac:spMkLst>
+              <pc:docMk/>
+              <pc:sldMasterMk cId="3937815069" sldId="2147483672"/>
+              <pc:sldLayoutMk cId="1643828127" sldId="2147483681"/>
+              <ac:spMk id="4" creationId="{00000000-0000-0000-0000-000000000000}"/>
+            </ac:spMkLst>
+          </pc:spChg>
+        </pc:sldLayoutChg>
+        <pc:sldLayoutChg chg="modSp">
+          <pc:chgData name="Maxwell Cook" userId="6270a8f4b8f62cae" providerId="LiveId" clId="{5064C11E-9D4E-8941-A2BE-AE2A4CD31B41}" dt="2023-08-30T16:58:00.670" v="15"/>
+          <pc:sldLayoutMkLst>
+            <pc:docMk/>
+            <pc:sldMasterMk cId="3937815069" sldId="2147483672"/>
+            <pc:sldLayoutMk cId="218020791" sldId="2147483683"/>
+          </pc:sldLayoutMkLst>
+          <pc:spChg chg="mod">
+            <ac:chgData name="Maxwell Cook" userId="6270a8f4b8f62cae" providerId="LiveId" clId="{5064C11E-9D4E-8941-A2BE-AE2A4CD31B41}" dt="2023-08-30T16:58:00.670" v="15"/>
+            <ac:spMkLst>
+              <pc:docMk/>
+              <pc:sldMasterMk cId="3937815069" sldId="2147483672"/>
+              <pc:sldLayoutMk cId="218020791" sldId="2147483683"/>
+              <ac:spMk id="2" creationId="{00000000-0000-0000-0000-000000000000}"/>
+            </ac:spMkLst>
+          </pc:spChg>
+          <pc:spChg chg="mod">
+            <ac:chgData name="Maxwell Cook" userId="6270a8f4b8f62cae" providerId="LiveId" clId="{5064C11E-9D4E-8941-A2BE-AE2A4CD31B41}" dt="2023-08-30T16:58:00.670" v="15"/>
+            <ac:spMkLst>
+              <pc:docMk/>
+              <pc:sldMasterMk cId="3937815069" sldId="2147483672"/>
+              <pc:sldLayoutMk cId="218020791" sldId="2147483683"/>
+              <ac:spMk id="3" creationId="{00000000-0000-0000-0000-000000000000}"/>
+            </ac:spMkLst>
+          </pc:spChg>
+        </pc:sldLayoutChg>
+      </pc:sldMasterChg>
+      <pc:sldMasterChg chg="modSp modSldLayout">
+        <pc:chgData name="Maxwell Cook" userId="6270a8f4b8f62cae" providerId="LiveId" clId="{5064C11E-9D4E-8941-A2BE-AE2A4CD31B41}" dt="2023-08-30T16:58:21.625" v="16"/>
+        <pc:sldMasterMkLst>
+          <pc:docMk/>
+          <pc:sldMasterMk cId="805906788" sldId="2147483684"/>
+        </pc:sldMasterMkLst>
+        <pc:spChg chg="mod">
+          <ac:chgData name="Maxwell Cook" userId="6270a8f4b8f62cae" providerId="LiveId" clId="{5064C11E-9D4E-8941-A2BE-AE2A4CD31B41}" dt="2023-08-30T16:58:21.625" v="16"/>
+          <ac:spMkLst>
+            <pc:docMk/>
+            <pc:sldMasterMk cId="805906788" sldId="2147483684"/>
+            <ac:spMk id="2" creationId="{00000000-0000-0000-0000-000000000000}"/>
+          </ac:spMkLst>
+        </pc:spChg>
+        <pc:spChg chg="mod">
+          <ac:chgData name="Maxwell Cook" userId="6270a8f4b8f62cae" providerId="LiveId" clId="{5064C11E-9D4E-8941-A2BE-AE2A4CD31B41}" dt="2023-08-30T16:58:21.625" v="16"/>
+          <ac:spMkLst>
+            <pc:docMk/>
+            <pc:sldMasterMk cId="805906788" sldId="2147483684"/>
+            <ac:spMk id="3" creationId="{00000000-0000-0000-0000-000000000000}"/>
+          </ac:spMkLst>
+        </pc:spChg>
+        <pc:spChg chg="mod">
+          <ac:chgData name="Maxwell Cook" userId="6270a8f4b8f62cae" providerId="LiveId" clId="{5064C11E-9D4E-8941-A2BE-AE2A4CD31B41}" dt="2023-08-30T16:58:21.625" v="16"/>
+          <ac:spMkLst>
+            <pc:docMk/>
+            <pc:sldMasterMk cId="805906788" sldId="2147483684"/>
+            <ac:spMk id="4" creationId="{00000000-0000-0000-0000-000000000000}"/>
+          </ac:spMkLst>
+        </pc:spChg>
+        <pc:spChg chg="mod">
+          <ac:chgData name="Maxwell Cook" userId="6270a8f4b8f62cae" providerId="LiveId" clId="{5064C11E-9D4E-8941-A2BE-AE2A4CD31B41}" dt="2023-08-30T16:58:21.625" v="16"/>
+          <ac:spMkLst>
+            <pc:docMk/>
+            <pc:sldMasterMk cId="805906788" sldId="2147483684"/>
+            <ac:spMk id="5" creationId="{00000000-0000-0000-0000-000000000000}"/>
+          </ac:spMkLst>
+        </pc:spChg>
+        <pc:spChg chg="mod">
+          <ac:chgData name="Maxwell Cook" userId="6270a8f4b8f62cae" providerId="LiveId" clId="{5064C11E-9D4E-8941-A2BE-AE2A4CD31B41}" dt="2023-08-30T16:58:21.625" v="16"/>
+          <ac:spMkLst>
+            <pc:docMk/>
+            <pc:sldMasterMk cId="805906788" sldId="2147483684"/>
+            <ac:spMk id="6" creationId="{00000000-0000-0000-0000-000000000000}"/>
+          </ac:spMkLst>
+        </pc:spChg>
+        <pc:sldLayoutChg chg="modSp">
+          <pc:chgData name="Maxwell Cook" userId="6270a8f4b8f62cae" providerId="LiveId" clId="{5064C11E-9D4E-8941-A2BE-AE2A4CD31B41}" dt="2023-08-30T16:58:21.625" v="16"/>
+          <pc:sldLayoutMkLst>
+            <pc:docMk/>
+            <pc:sldMasterMk cId="805906788" sldId="2147483684"/>
+            <pc:sldLayoutMk cId="5901808" sldId="2147483685"/>
+          </pc:sldLayoutMkLst>
+          <pc:spChg chg="mod">
+            <ac:chgData name="Maxwell Cook" userId="6270a8f4b8f62cae" providerId="LiveId" clId="{5064C11E-9D4E-8941-A2BE-AE2A4CD31B41}" dt="2023-08-30T16:58:21.625" v="16"/>
+            <ac:spMkLst>
+              <pc:docMk/>
+              <pc:sldMasterMk cId="805906788" sldId="2147483684"/>
+              <pc:sldLayoutMk cId="5901808" sldId="2147483685"/>
+              <ac:spMk id="2" creationId="{00000000-0000-0000-0000-000000000000}"/>
+            </ac:spMkLst>
+          </pc:spChg>
+          <pc:spChg chg="mod">
+            <ac:chgData name="Maxwell Cook" userId="6270a8f4b8f62cae" providerId="LiveId" clId="{5064C11E-9D4E-8941-A2BE-AE2A4CD31B41}" dt="2023-08-30T16:58:21.625" v="16"/>
+            <ac:spMkLst>
+              <pc:docMk/>
+              <pc:sldMasterMk cId="805906788" sldId="2147483684"/>
+              <pc:sldLayoutMk cId="5901808" sldId="2147483685"/>
+              <ac:spMk id="3" creationId="{00000000-0000-0000-0000-000000000000}"/>
+            </ac:spMkLst>
+          </pc:spChg>
+        </pc:sldLayoutChg>
+        <pc:sldLayoutChg chg="modSp">
+          <pc:chgData name="Maxwell Cook" userId="6270a8f4b8f62cae" providerId="LiveId" clId="{5064C11E-9D4E-8941-A2BE-AE2A4CD31B41}" dt="2023-08-30T16:58:21.625" v="16"/>
+          <pc:sldLayoutMkLst>
+            <pc:docMk/>
+            <pc:sldMasterMk cId="805906788" sldId="2147483684"/>
+            <pc:sldLayoutMk cId="3283417422" sldId="2147483687"/>
+          </pc:sldLayoutMkLst>
+          <pc:spChg chg="mod">
+            <ac:chgData name="Maxwell Cook" userId="6270a8f4b8f62cae" providerId="LiveId" clId="{5064C11E-9D4E-8941-A2BE-AE2A4CD31B41}" dt="2023-08-30T16:58:21.625" v="16"/>
+            <ac:spMkLst>
+              <pc:docMk/>
+              <pc:sldMasterMk cId="805906788" sldId="2147483684"/>
+              <pc:sldLayoutMk cId="3283417422" sldId="2147483687"/>
+              <ac:spMk id="2" creationId="{00000000-0000-0000-0000-000000000000}"/>
+            </ac:spMkLst>
+          </pc:spChg>
+          <pc:spChg chg="mod">
+            <ac:chgData name="Maxwell Cook" userId="6270a8f4b8f62cae" providerId="LiveId" clId="{5064C11E-9D4E-8941-A2BE-AE2A4CD31B41}" dt="2023-08-30T16:58:21.625" v="16"/>
+            <ac:spMkLst>
+              <pc:docMk/>
+              <pc:sldMasterMk cId="805906788" sldId="2147483684"/>
+              <pc:sldLayoutMk cId="3283417422" sldId="2147483687"/>
+              <ac:spMk id="3" creationId="{00000000-0000-0000-0000-000000000000}"/>
+            </ac:spMkLst>
+          </pc:spChg>
+        </pc:sldLayoutChg>
+        <pc:sldLayoutChg chg="modSp">
+          <pc:chgData name="Maxwell Cook" userId="6270a8f4b8f62cae" providerId="LiveId" clId="{5064C11E-9D4E-8941-A2BE-AE2A4CD31B41}" dt="2023-08-30T16:58:21.625" v="16"/>
+          <pc:sldLayoutMkLst>
+            <pc:docMk/>
+            <pc:sldMasterMk cId="805906788" sldId="2147483684"/>
+            <pc:sldLayoutMk cId="1624533910" sldId="2147483688"/>
+          </pc:sldLayoutMkLst>
+          <pc:spChg chg="mod">
+            <ac:chgData name="Maxwell Cook" userId="6270a8f4b8f62cae" providerId="LiveId" clId="{5064C11E-9D4E-8941-A2BE-AE2A4CD31B41}" dt="2023-08-30T16:58:21.625" v="16"/>
+            <ac:spMkLst>
+              <pc:docMk/>
+              <pc:sldMasterMk cId="805906788" sldId="2147483684"/>
+              <pc:sldLayoutMk cId="1624533910" sldId="2147483688"/>
+              <ac:spMk id="3" creationId="{00000000-0000-0000-0000-000000000000}"/>
+            </ac:spMkLst>
+          </pc:spChg>
+          <pc:spChg chg="mod">
+            <ac:chgData name="Maxwell Cook" userId="6270a8f4b8f62cae" providerId="LiveId" clId="{5064C11E-9D4E-8941-A2BE-AE2A4CD31B41}" dt="2023-08-30T16:58:21.625" v="16"/>
+            <ac:spMkLst>
+              <pc:docMk/>
+              <pc:sldMasterMk cId="805906788" sldId="2147483684"/>
+              <pc:sldLayoutMk cId="1624533910" sldId="2147483688"/>
+              <ac:spMk id="4" creationId="{00000000-0000-0000-0000-000000000000}"/>
+            </ac:spMkLst>
+          </pc:spChg>
+        </pc:sldLayoutChg>
+        <pc:sldLayoutChg chg="modSp">
+          <pc:chgData name="Maxwell Cook" userId="6270a8f4b8f62cae" providerId="LiveId" clId="{5064C11E-9D4E-8941-A2BE-AE2A4CD31B41}" dt="2023-08-30T16:58:21.625" v="16"/>
+          <pc:sldLayoutMkLst>
+            <pc:docMk/>
+            <pc:sldMasterMk cId="805906788" sldId="2147483684"/>
+            <pc:sldLayoutMk cId="3922700655" sldId="2147483689"/>
+          </pc:sldLayoutMkLst>
+          <pc:spChg chg="mod">
+            <ac:chgData name="Maxwell Cook" userId="6270a8f4b8f62cae" providerId="LiveId" clId="{5064C11E-9D4E-8941-A2BE-AE2A4CD31B41}" dt="2023-08-30T16:58:21.625" v="16"/>
+            <ac:spMkLst>
+              <pc:docMk/>
+              <pc:sldMasterMk cId="805906788" sldId="2147483684"/>
+              <pc:sldLayoutMk cId="3922700655" sldId="2147483689"/>
+              <ac:spMk id="2" creationId="{00000000-0000-0000-0000-000000000000}"/>
+            </ac:spMkLst>
+          </pc:spChg>
+          <pc:spChg chg="mod">
+            <ac:chgData name="Maxwell Cook" userId="6270a8f4b8f62cae" providerId="LiveId" clId="{5064C11E-9D4E-8941-A2BE-AE2A4CD31B41}" dt="2023-08-30T16:58:21.625" v="16"/>
+            <ac:spMkLst>
+              <pc:docMk/>
+              <pc:sldMasterMk cId="805906788" sldId="2147483684"/>
+              <pc:sldLayoutMk cId="3922700655" sldId="2147483689"/>
+              <ac:spMk id="3" creationId="{00000000-0000-0000-0000-000000000000}"/>
+            </ac:spMkLst>
+          </pc:spChg>
+          <pc:spChg chg="mod">
+            <ac:chgData name="Maxwell Cook" userId="6270a8f4b8f62cae" providerId="LiveId" clId="{5064C11E-9D4E-8941-A2BE-AE2A4CD31B41}" dt="2023-08-30T16:58:21.625" v="16"/>
+            <ac:spMkLst>
+              <pc:docMk/>
+              <pc:sldMasterMk cId="805906788" sldId="2147483684"/>
+              <pc:sldLayoutMk cId="3922700655" sldId="2147483689"/>
+              <ac:spMk id="4" creationId="{00000000-0000-0000-0000-000000000000}"/>
+            </ac:spMkLst>
+          </pc:spChg>
+          <pc:spChg chg="mod">
+            <ac:chgData name="Maxwell Cook" userId="6270a8f4b8f62cae" providerId="LiveId" clId="{5064C11E-9D4E-8941-A2BE-AE2A4CD31B41}" dt="2023-08-30T16:58:21.625" v="16"/>
+            <ac:spMkLst>
+              <pc:docMk/>
+              <pc:sldMasterMk cId="805906788" sldId="2147483684"/>
+              <pc:sldLayoutMk cId="3922700655" sldId="2147483689"/>
+              <ac:spMk id="5" creationId="{00000000-0000-0000-0000-000000000000}"/>
+            </ac:spMkLst>
+          </pc:spChg>
+          <pc:spChg chg="mod">
+            <ac:chgData name="Maxwell Cook" userId="6270a8f4b8f62cae" providerId="LiveId" clId="{5064C11E-9D4E-8941-A2BE-AE2A4CD31B41}" dt="2023-08-30T16:58:21.625" v="16"/>
+            <ac:spMkLst>
+              <pc:docMk/>
+              <pc:sldMasterMk cId="805906788" sldId="2147483684"/>
+              <pc:sldLayoutMk cId="3922700655" sldId="2147483689"/>
+              <ac:spMk id="6" creationId="{00000000-0000-0000-0000-000000000000}"/>
+            </ac:spMkLst>
+          </pc:spChg>
+        </pc:sldLayoutChg>
+        <pc:sldLayoutChg chg="modSp">
+          <pc:chgData name="Maxwell Cook" userId="6270a8f4b8f62cae" providerId="LiveId" clId="{5064C11E-9D4E-8941-A2BE-AE2A4CD31B41}" dt="2023-08-30T16:58:21.625" v="16"/>
+          <pc:sldLayoutMkLst>
+            <pc:docMk/>
+            <pc:sldMasterMk cId="805906788" sldId="2147483684"/>
+            <pc:sldLayoutMk cId="1665539301" sldId="2147483692"/>
+          </pc:sldLayoutMkLst>
+          <pc:spChg chg="mod">
+            <ac:chgData name="Maxwell Cook" userId="6270a8f4b8f62cae" providerId="LiveId" clId="{5064C11E-9D4E-8941-A2BE-AE2A4CD31B41}" dt="2023-08-30T16:58:21.625" v="16"/>
+            <ac:spMkLst>
+              <pc:docMk/>
+              <pc:sldMasterMk cId="805906788" sldId="2147483684"/>
+              <pc:sldLayoutMk cId="1665539301" sldId="2147483692"/>
+              <ac:spMk id="2" creationId="{00000000-0000-0000-0000-000000000000}"/>
+            </ac:spMkLst>
+          </pc:spChg>
+          <pc:spChg chg="mod">
+            <ac:chgData name="Maxwell Cook" userId="6270a8f4b8f62cae" providerId="LiveId" clId="{5064C11E-9D4E-8941-A2BE-AE2A4CD31B41}" dt="2023-08-30T16:58:21.625" v="16"/>
+            <ac:spMkLst>
+              <pc:docMk/>
+              <pc:sldMasterMk cId="805906788" sldId="2147483684"/>
+              <pc:sldLayoutMk cId="1665539301" sldId="2147483692"/>
+              <ac:spMk id="3" creationId="{00000000-0000-0000-0000-000000000000}"/>
+            </ac:spMkLst>
+          </pc:spChg>
+          <pc:spChg chg="mod">
+            <ac:chgData name="Maxwell Cook" userId="6270a8f4b8f62cae" providerId="LiveId" clId="{5064C11E-9D4E-8941-A2BE-AE2A4CD31B41}" dt="2023-08-30T16:58:21.625" v="16"/>
+            <ac:spMkLst>
+              <pc:docMk/>
+              <pc:sldMasterMk cId="805906788" sldId="2147483684"/>
+              <pc:sldLayoutMk cId="1665539301" sldId="2147483692"/>
+              <ac:spMk id="4" creationId="{00000000-0000-0000-0000-000000000000}"/>
+            </ac:spMkLst>
+          </pc:spChg>
+        </pc:sldLayoutChg>
+        <pc:sldLayoutChg chg="modSp">
+          <pc:chgData name="Maxwell Cook" userId="6270a8f4b8f62cae" providerId="LiveId" clId="{5064C11E-9D4E-8941-A2BE-AE2A4CD31B41}" dt="2023-08-30T16:58:21.625" v="16"/>
+          <pc:sldLayoutMkLst>
+            <pc:docMk/>
+            <pc:sldMasterMk cId="805906788" sldId="2147483684"/>
+            <pc:sldLayoutMk cId="1377596188" sldId="2147483693"/>
+          </pc:sldLayoutMkLst>
+          <pc:spChg chg="mod">
+            <ac:chgData name="Maxwell Cook" userId="6270a8f4b8f62cae" providerId="LiveId" clId="{5064C11E-9D4E-8941-A2BE-AE2A4CD31B41}" dt="2023-08-30T16:58:21.625" v="16"/>
+            <ac:spMkLst>
+              <pc:docMk/>
+              <pc:sldMasterMk cId="805906788" sldId="2147483684"/>
+              <pc:sldLayoutMk cId="1377596188" sldId="2147483693"/>
+              <ac:spMk id="2" creationId="{00000000-0000-0000-0000-000000000000}"/>
+            </ac:spMkLst>
+          </pc:spChg>
+          <pc:spChg chg="mod">
+            <ac:chgData name="Maxwell Cook" userId="6270a8f4b8f62cae" providerId="LiveId" clId="{5064C11E-9D4E-8941-A2BE-AE2A4CD31B41}" dt="2023-08-30T16:58:21.625" v="16"/>
+            <ac:spMkLst>
+              <pc:docMk/>
+              <pc:sldMasterMk cId="805906788" sldId="2147483684"/>
+              <pc:sldLayoutMk cId="1377596188" sldId="2147483693"/>
+              <ac:spMk id="3" creationId="{00000000-0000-0000-0000-000000000000}"/>
+            </ac:spMkLst>
+          </pc:spChg>
+          <pc:spChg chg="mod">
+            <ac:chgData name="Maxwell Cook" userId="6270a8f4b8f62cae" providerId="LiveId" clId="{5064C11E-9D4E-8941-A2BE-AE2A4CD31B41}" dt="2023-08-30T16:58:21.625" v="16"/>
+            <ac:spMkLst>
+              <pc:docMk/>
+              <pc:sldMasterMk cId="805906788" sldId="2147483684"/>
+              <pc:sldLayoutMk cId="1377596188" sldId="2147483693"/>
+              <ac:spMk id="4" creationId="{00000000-0000-0000-0000-000000000000}"/>
+            </ac:spMkLst>
+          </pc:spChg>
+        </pc:sldLayoutChg>
+        <pc:sldLayoutChg chg="modSp">
+          <pc:chgData name="Maxwell Cook" userId="6270a8f4b8f62cae" providerId="LiveId" clId="{5064C11E-9D4E-8941-A2BE-AE2A4CD31B41}" dt="2023-08-30T16:58:21.625" v="16"/>
+          <pc:sldLayoutMkLst>
+            <pc:docMk/>
+            <pc:sldMasterMk cId="805906788" sldId="2147483684"/>
+            <pc:sldLayoutMk cId="1554714573" sldId="2147483695"/>
+          </pc:sldLayoutMkLst>
+          <pc:spChg chg="mod">
+            <ac:chgData name="Maxwell Cook" userId="6270a8f4b8f62cae" providerId="LiveId" clId="{5064C11E-9D4E-8941-A2BE-AE2A4CD31B41}" dt="2023-08-30T16:58:21.625" v="16"/>
+            <ac:spMkLst>
+              <pc:docMk/>
+              <pc:sldMasterMk cId="805906788" sldId="2147483684"/>
+              <pc:sldLayoutMk cId="1554714573" sldId="2147483695"/>
+              <ac:spMk id="2" creationId="{00000000-0000-0000-0000-000000000000}"/>
+            </ac:spMkLst>
+          </pc:spChg>
+          <pc:spChg chg="mod">
+            <ac:chgData name="Maxwell Cook" userId="6270a8f4b8f62cae" providerId="LiveId" clId="{5064C11E-9D4E-8941-A2BE-AE2A4CD31B41}" dt="2023-08-30T16:58:21.625" v="16"/>
+            <ac:spMkLst>
+              <pc:docMk/>
+              <pc:sldMasterMk cId="805906788" sldId="2147483684"/>
+              <pc:sldLayoutMk cId="1554714573" sldId="2147483695"/>
+              <ac:spMk id="3" creationId="{00000000-0000-0000-0000-000000000000}"/>
+            </ac:spMkLst>
+          </pc:spChg>
+        </pc:sldLayoutChg>
+      </pc:sldMasterChg>
+    </pc:docChg>
+  </pc:docChgLst>
+</pc:chgInfo>
 </file>
 
 <file path=ppt/slideLayouts/slideLayout1.xml><?xml version="1.0" encoding="utf-8"?>
@@ -136,15 +1001,15 @@
         </p:nvSpPr>
         <p:spPr>
           <a:xfrm>
-            <a:off x="514350" y="1197187"/>
-            <a:ext cx="5829300" cy="2546773"/>
+            <a:off x="445770" y="1197187"/>
+            <a:ext cx="5052060" cy="2546773"/>
           </a:xfrm>
         </p:spPr>
         <p:txBody>
           <a:bodyPr anchor="b"/>
           <a:lstStyle>
             <a:lvl1pPr algn="ctr">
-              <a:defRPr sz="4500"/>
+              <a:defRPr sz="3900"/>
             </a:lvl1pPr>
           </a:lstStyle>
           <a:p>
@@ -168,8 +1033,8 @@
         </p:nvSpPr>
         <p:spPr>
           <a:xfrm>
-            <a:off x="857250" y="3842174"/>
-            <a:ext cx="5143500" cy="1766146"/>
+            <a:off x="742950" y="3842174"/>
+            <a:ext cx="4457700" cy="1766146"/>
           </a:xfrm>
         </p:spPr>
         <p:txBody>
@@ -177,39 +1042,39 @@
           <a:lstStyle>
             <a:lvl1pPr marL="0" indent="0" algn="ctr">
               <a:buNone/>
-              <a:defRPr sz="1800"/>
+              <a:defRPr sz="1560"/>
             </a:lvl1pPr>
-            <a:lvl2pPr marL="342900" indent="0" algn="ctr">
-              <a:buNone/>
-              <a:defRPr sz="1500"/>
+            <a:lvl2pPr marL="297180" indent="0" algn="ctr">
+              <a:buNone/>
+              <a:defRPr sz="1300"/>
             </a:lvl2pPr>
-            <a:lvl3pPr marL="685800" indent="0" algn="ctr">
-              <a:buNone/>
-              <a:defRPr sz="1350"/>
+            <a:lvl3pPr marL="594360" indent="0" algn="ctr">
+              <a:buNone/>
+              <a:defRPr sz="1170"/>
             </a:lvl3pPr>
-            <a:lvl4pPr marL="1028700" indent="0" algn="ctr">
-              <a:buNone/>
-              <a:defRPr sz="1200"/>
+            <a:lvl4pPr marL="891540" indent="0" algn="ctr">
+              <a:buNone/>
+              <a:defRPr sz="1040"/>
             </a:lvl4pPr>
-            <a:lvl5pPr marL="1371600" indent="0" algn="ctr">
-              <a:buNone/>
-              <a:defRPr sz="1200"/>
+            <a:lvl5pPr marL="1188720" indent="0" algn="ctr">
+              <a:buNone/>
+              <a:defRPr sz="1040"/>
             </a:lvl5pPr>
-            <a:lvl6pPr marL="1714500" indent="0" algn="ctr">
-              <a:buNone/>
-              <a:defRPr sz="1200"/>
+            <a:lvl6pPr marL="1485900" indent="0" algn="ctr">
+              <a:buNone/>
+              <a:defRPr sz="1040"/>
             </a:lvl6pPr>
-            <a:lvl7pPr marL="2057400" indent="0" algn="ctr">
-              <a:buNone/>
-              <a:defRPr sz="1200"/>
+            <a:lvl7pPr marL="1783080" indent="0" algn="ctr">
+              <a:buNone/>
+              <a:defRPr sz="1040"/>
             </a:lvl7pPr>
-            <a:lvl8pPr marL="2400300" indent="0" algn="ctr">
-              <a:buNone/>
-              <a:defRPr sz="1200"/>
+            <a:lvl8pPr marL="2080260" indent="0" algn="ctr">
+              <a:buNone/>
+              <a:defRPr sz="1040"/>
             </a:lvl8pPr>
-            <a:lvl9pPr marL="2743200" indent="0" algn="ctr">
-              <a:buNone/>
-              <a:defRPr sz="1200"/>
+            <a:lvl9pPr marL="2377440" indent="0" algn="ctr">
+              <a:buNone/>
+              <a:defRPr sz="1040"/>
             </a:lvl9pPr>
           </a:lstStyle>
           <a:p>
@@ -238,7 +1103,7 @@
           <a:p>
             <a:fld id="{7E773BE6-0A1E-D04A-93D4-644A66363E90}" type="datetimeFigureOut">
               <a:rPr lang="en-US" smtClean="0"/>
-              <a:t>8/29/23</a:t>
+              <a:t>8/30/23</a:t>
             </a:fld>
             <a:endParaRPr lang="en-US"/>
           </a:p>
@@ -289,7 +1154,7 @@
     </p:spTree>
     <p:extLst>
       <p:ext uri="{BB962C8B-B14F-4D97-AF65-F5344CB8AC3E}">
-        <p14:creationId xmlns:p14="http://schemas.microsoft.com/office/powerpoint/2010/main" val="2253946723"/>
+        <p14:creationId xmlns:p14="http://schemas.microsoft.com/office/powerpoint/2010/main" val="2849748365"/>
       </p:ext>
     </p:extLst>
   </p:cSld>
@@ -408,7 +1273,7 @@
           <a:p>
             <a:fld id="{7E773BE6-0A1E-D04A-93D4-644A66363E90}" type="datetimeFigureOut">
               <a:rPr lang="en-US" smtClean="0"/>
-              <a:t>8/29/23</a:t>
+              <a:t>8/30/23</a:t>
             </a:fld>
             <a:endParaRPr lang="en-US"/>
           </a:p>
@@ -459,7 +1324,7 @@
     </p:spTree>
     <p:extLst>
       <p:ext uri="{BB962C8B-B14F-4D97-AF65-F5344CB8AC3E}">
-        <p14:creationId xmlns:p14="http://schemas.microsoft.com/office/powerpoint/2010/main" val="3346399205"/>
+        <p14:creationId xmlns:p14="http://schemas.microsoft.com/office/powerpoint/2010/main" val="2628725195"/>
       </p:ext>
     </p:extLst>
   </p:cSld>
@@ -498,8 +1363,8 @@
         </p:nvSpPr>
         <p:spPr>
           <a:xfrm>
-            <a:off x="4907757" y="389467"/>
-            <a:ext cx="1478756" cy="6199294"/>
+            <a:off x="4253389" y="389467"/>
+            <a:ext cx="1281589" cy="6199294"/>
           </a:xfrm>
         </p:spPr>
         <p:txBody>
@@ -526,8 +1391,8 @@
         </p:nvSpPr>
         <p:spPr>
           <a:xfrm>
-            <a:off x="471488" y="389467"/>
-            <a:ext cx="4350544" cy="6199294"/>
+            <a:off x="408623" y="389467"/>
+            <a:ext cx="3770471" cy="6199294"/>
           </a:xfrm>
         </p:spPr>
         <p:txBody>
@@ -588,7 +1453,7 @@
           <a:p>
             <a:fld id="{7E773BE6-0A1E-D04A-93D4-644A66363E90}" type="datetimeFigureOut">
               <a:rPr lang="en-US" smtClean="0"/>
-              <a:t>8/29/23</a:t>
+              <a:t>8/30/23</a:t>
             </a:fld>
             <a:endParaRPr lang="en-US"/>
           </a:p>
@@ -639,7 +1504,7 @@
     </p:spTree>
     <p:extLst>
       <p:ext uri="{BB962C8B-B14F-4D97-AF65-F5344CB8AC3E}">
-        <p14:creationId xmlns:p14="http://schemas.microsoft.com/office/powerpoint/2010/main" val="218020791"/>
+        <p14:creationId xmlns:p14="http://schemas.microsoft.com/office/powerpoint/2010/main" val="4277848042"/>
       </p:ext>
     </p:extLst>
   </p:cSld>
@@ -758,7 +1623,7 @@
           <a:p>
             <a:fld id="{7E773BE6-0A1E-D04A-93D4-644A66363E90}" type="datetimeFigureOut">
               <a:rPr lang="en-US" smtClean="0"/>
-              <a:t>8/29/23</a:t>
+              <a:t>8/30/23</a:t>
             </a:fld>
             <a:endParaRPr lang="en-US"/>
           </a:p>
@@ -809,7 +1674,7 @@
     </p:spTree>
     <p:extLst>
       <p:ext uri="{BB962C8B-B14F-4D97-AF65-F5344CB8AC3E}">
-        <p14:creationId xmlns:p14="http://schemas.microsoft.com/office/powerpoint/2010/main" val="2828393654"/>
+        <p14:creationId xmlns:p14="http://schemas.microsoft.com/office/powerpoint/2010/main" val="1044599966"/>
       </p:ext>
     </p:extLst>
   </p:cSld>
@@ -848,15 +1713,15 @@
         </p:nvSpPr>
         <p:spPr>
           <a:xfrm>
-            <a:off x="467916" y="1823722"/>
-            <a:ext cx="5915025" cy="3042919"/>
+            <a:off x="405527" y="1823722"/>
+            <a:ext cx="5126355" cy="3042919"/>
           </a:xfrm>
         </p:spPr>
         <p:txBody>
           <a:bodyPr anchor="b"/>
           <a:lstStyle>
             <a:lvl1pPr>
-              <a:defRPr sz="4500"/>
+              <a:defRPr sz="3900"/>
             </a:lvl1pPr>
           </a:lstStyle>
           <a:p>
@@ -880,8 +1745,8 @@
         </p:nvSpPr>
         <p:spPr>
           <a:xfrm>
-            <a:off x="467916" y="4895429"/>
-            <a:ext cx="5915025" cy="1600199"/>
+            <a:off x="405527" y="4895429"/>
+            <a:ext cx="5126355" cy="1600199"/>
           </a:xfrm>
         </p:spPr>
         <p:txBody>
@@ -889,15 +1754,15 @@
           <a:lstStyle>
             <a:lvl1pPr marL="0" indent="0">
               <a:buNone/>
-              <a:defRPr sz="1800">
+              <a:defRPr sz="1560">
                 <a:solidFill>
                   <a:schemeClr val="tx1"/>
                 </a:solidFill>
               </a:defRPr>
             </a:lvl1pPr>
-            <a:lvl2pPr marL="342900" indent="0">
-              <a:buNone/>
-              <a:defRPr sz="1500">
+            <a:lvl2pPr marL="297180" indent="0">
+              <a:buNone/>
+              <a:defRPr sz="1300">
                 <a:solidFill>
                   <a:schemeClr val="tx1">
                     <a:tint val="75000"/>
@@ -905,9 +1770,9 @@
                 </a:solidFill>
               </a:defRPr>
             </a:lvl2pPr>
-            <a:lvl3pPr marL="685800" indent="0">
-              <a:buNone/>
-              <a:defRPr sz="1350">
+            <a:lvl3pPr marL="594360" indent="0">
+              <a:buNone/>
+              <a:defRPr sz="1170">
                 <a:solidFill>
                   <a:schemeClr val="tx1">
                     <a:tint val="75000"/>
@@ -915,9 +1780,9 @@
                 </a:solidFill>
               </a:defRPr>
             </a:lvl3pPr>
-            <a:lvl4pPr marL="1028700" indent="0">
-              <a:buNone/>
-              <a:defRPr sz="1200">
+            <a:lvl4pPr marL="891540" indent="0">
+              <a:buNone/>
+              <a:defRPr sz="1040">
                 <a:solidFill>
                   <a:schemeClr val="tx1">
                     <a:tint val="75000"/>
@@ -925,9 +1790,9 @@
                 </a:solidFill>
               </a:defRPr>
             </a:lvl4pPr>
-            <a:lvl5pPr marL="1371600" indent="0">
-              <a:buNone/>
-              <a:defRPr sz="1200">
+            <a:lvl5pPr marL="1188720" indent="0">
+              <a:buNone/>
+              <a:defRPr sz="1040">
                 <a:solidFill>
                   <a:schemeClr val="tx1">
                     <a:tint val="75000"/>
@@ -935,9 +1800,9 @@
                 </a:solidFill>
               </a:defRPr>
             </a:lvl5pPr>
-            <a:lvl6pPr marL="1714500" indent="0">
-              <a:buNone/>
-              <a:defRPr sz="1200">
+            <a:lvl6pPr marL="1485900" indent="0">
+              <a:buNone/>
+              <a:defRPr sz="1040">
                 <a:solidFill>
                   <a:schemeClr val="tx1">
                     <a:tint val="75000"/>
@@ -945,9 +1810,9 @@
                 </a:solidFill>
               </a:defRPr>
             </a:lvl6pPr>
-            <a:lvl7pPr marL="2057400" indent="0">
-              <a:buNone/>
-              <a:defRPr sz="1200">
+            <a:lvl7pPr marL="1783080" indent="0">
+              <a:buNone/>
+              <a:defRPr sz="1040">
                 <a:solidFill>
                   <a:schemeClr val="tx1">
                     <a:tint val="75000"/>
@@ -955,9 +1820,9 @@
                 </a:solidFill>
               </a:defRPr>
             </a:lvl7pPr>
-            <a:lvl8pPr marL="2400300" indent="0">
-              <a:buNone/>
-              <a:defRPr sz="1200">
+            <a:lvl8pPr marL="2080260" indent="0">
+              <a:buNone/>
+              <a:defRPr sz="1040">
                 <a:solidFill>
                   <a:schemeClr val="tx1">
                     <a:tint val="75000"/>
@@ -965,9 +1830,9 @@
                 </a:solidFill>
               </a:defRPr>
             </a:lvl8pPr>
-            <a:lvl9pPr marL="2743200" indent="0">
-              <a:buNone/>
-              <a:defRPr sz="1200">
+            <a:lvl9pPr marL="2377440" indent="0">
+              <a:buNone/>
+              <a:defRPr sz="1040">
                 <a:solidFill>
                   <a:schemeClr val="tx1">
                     <a:tint val="75000"/>
@@ -1002,7 +1867,7 @@
           <a:p>
             <a:fld id="{7E773BE6-0A1E-D04A-93D4-644A66363E90}" type="datetimeFigureOut">
               <a:rPr lang="en-US" smtClean="0"/>
-              <a:t>8/29/23</a:t>
+              <a:t>8/30/23</a:t>
             </a:fld>
             <a:endParaRPr lang="en-US"/>
           </a:p>
@@ -1053,7 +1918,7 @@
     </p:spTree>
     <p:extLst>
       <p:ext uri="{BB962C8B-B14F-4D97-AF65-F5344CB8AC3E}">
-        <p14:creationId xmlns:p14="http://schemas.microsoft.com/office/powerpoint/2010/main" val="2724168220"/>
+        <p14:creationId xmlns:p14="http://schemas.microsoft.com/office/powerpoint/2010/main" val="4053429227"/>
       </p:ext>
     </p:extLst>
   </p:cSld>
@@ -1115,8 +1980,8 @@
         </p:nvSpPr>
         <p:spPr>
           <a:xfrm>
-            <a:off x="471488" y="1947333"/>
-            <a:ext cx="2914650" cy="4641427"/>
+            <a:off x="408623" y="1947333"/>
+            <a:ext cx="2526030" cy="4641427"/>
           </a:xfrm>
         </p:spPr>
         <p:txBody>
@@ -1172,8 +2037,8 @@
         </p:nvSpPr>
         <p:spPr>
           <a:xfrm>
-            <a:off x="3471863" y="1947333"/>
-            <a:ext cx="2914650" cy="4641427"/>
+            <a:off x="3008948" y="1947333"/>
+            <a:ext cx="2526030" cy="4641427"/>
           </a:xfrm>
         </p:spPr>
         <p:txBody>
@@ -1234,7 +2099,7 @@
           <a:p>
             <a:fld id="{7E773BE6-0A1E-D04A-93D4-644A66363E90}" type="datetimeFigureOut">
               <a:rPr lang="en-US" smtClean="0"/>
-              <a:t>8/29/23</a:t>
+              <a:t>8/30/23</a:t>
             </a:fld>
             <a:endParaRPr lang="en-US"/>
           </a:p>
@@ -1285,7 +2150,7 @@
     </p:spTree>
     <p:extLst>
       <p:ext uri="{BB962C8B-B14F-4D97-AF65-F5344CB8AC3E}">
-        <p14:creationId xmlns:p14="http://schemas.microsoft.com/office/powerpoint/2010/main" val="3075857211"/>
+        <p14:creationId xmlns:p14="http://schemas.microsoft.com/office/powerpoint/2010/main" val="1214906396"/>
       </p:ext>
     </p:extLst>
   </p:cSld>
@@ -1324,8 +2189,8 @@
         </p:nvSpPr>
         <p:spPr>
           <a:xfrm>
-            <a:off x="472381" y="389468"/>
-            <a:ext cx="5915025" cy="1413934"/>
+            <a:off x="409397" y="389468"/>
+            <a:ext cx="5126355" cy="1413934"/>
           </a:xfrm>
         </p:spPr>
         <p:txBody>
@@ -1352,8 +2217,8 @@
         </p:nvSpPr>
         <p:spPr>
           <a:xfrm>
-            <a:off x="472381" y="1793241"/>
-            <a:ext cx="2901255" cy="878839"/>
+            <a:off x="409397" y="1793241"/>
+            <a:ext cx="2514421" cy="878839"/>
           </a:xfrm>
         </p:spPr>
         <p:txBody>
@@ -1361,39 +2226,39 @@
           <a:lstStyle>
             <a:lvl1pPr marL="0" indent="0">
               <a:buNone/>
-              <a:defRPr sz="1800" b="1"/>
+              <a:defRPr sz="1560" b="1"/>
             </a:lvl1pPr>
-            <a:lvl2pPr marL="342900" indent="0">
-              <a:buNone/>
-              <a:defRPr sz="1500" b="1"/>
+            <a:lvl2pPr marL="297180" indent="0">
+              <a:buNone/>
+              <a:defRPr sz="1300" b="1"/>
             </a:lvl2pPr>
-            <a:lvl3pPr marL="685800" indent="0">
-              <a:buNone/>
-              <a:defRPr sz="1350" b="1"/>
+            <a:lvl3pPr marL="594360" indent="0">
+              <a:buNone/>
+              <a:defRPr sz="1170" b="1"/>
             </a:lvl3pPr>
-            <a:lvl4pPr marL="1028700" indent="0">
-              <a:buNone/>
-              <a:defRPr sz="1200" b="1"/>
+            <a:lvl4pPr marL="891540" indent="0">
+              <a:buNone/>
+              <a:defRPr sz="1040" b="1"/>
             </a:lvl4pPr>
-            <a:lvl5pPr marL="1371600" indent="0">
-              <a:buNone/>
-              <a:defRPr sz="1200" b="1"/>
+            <a:lvl5pPr marL="1188720" indent="0">
+              <a:buNone/>
+              <a:defRPr sz="1040" b="1"/>
             </a:lvl5pPr>
-            <a:lvl6pPr marL="1714500" indent="0">
-              <a:buNone/>
-              <a:defRPr sz="1200" b="1"/>
+            <a:lvl6pPr marL="1485900" indent="0">
+              <a:buNone/>
+              <a:defRPr sz="1040" b="1"/>
             </a:lvl6pPr>
-            <a:lvl7pPr marL="2057400" indent="0">
-              <a:buNone/>
-              <a:defRPr sz="1200" b="1"/>
+            <a:lvl7pPr marL="1783080" indent="0">
+              <a:buNone/>
+              <a:defRPr sz="1040" b="1"/>
             </a:lvl7pPr>
-            <a:lvl8pPr marL="2400300" indent="0">
-              <a:buNone/>
-              <a:defRPr sz="1200" b="1"/>
+            <a:lvl8pPr marL="2080260" indent="0">
+              <a:buNone/>
+              <a:defRPr sz="1040" b="1"/>
             </a:lvl8pPr>
-            <a:lvl9pPr marL="2743200" indent="0">
-              <a:buNone/>
-              <a:defRPr sz="1200" b="1"/>
+            <a:lvl9pPr marL="2377440" indent="0">
+              <a:buNone/>
+              <a:defRPr sz="1040" b="1"/>
             </a:lvl9pPr>
           </a:lstStyle>
           <a:p>
@@ -1417,8 +2282,8 @@
         </p:nvSpPr>
         <p:spPr>
           <a:xfrm>
-            <a:off x="472381" y="2672080"/>
-            <a:ext cx="2901255" cy="3930227"/>
+            <a:off x="409397" y="2672080"/>
+            <a:ext cx="2514421" cy="3930227"/>
           </a:xfrm>
         </p:spPr>
         <p:txBody>
@@ -1474,8 +2339,8 @@
         </p:nvSpPr>
         <p:spPr>
           <a:xfrm>
-            <a:off x="3471863" y="1793241"/>
-            <a:ext cx="2915543" cy="878839"/>
+            <a:off x="3008948" y="1793241"/>
+            <a:ext cx="2526804" cy="878839"/>
           </a:xfrm>
         </p:spPr>
         <p:txBody>
@@ -1483,39 +2348,39 @@
           <a:lstStyle>
             <a:lvl1pPr marL="0" indent="0">
               <a:buNone/>
-              <a:defRPr sz="1800" b="1"/>
+              <a:defRPr sz="1560" b="1"/>
             </a:lvl1pPr>
-            <a:lvl2pPr marL="342900" indent="0">
-              <a:buNone/>
-              <a:defRPr sz="1500" b="1"/>
+            <a:lvl2pPr marL="297180" indent="0">
+              <a:buNone/>
+              <a:defRPr sz="1300" b="1"/>
             </a:lvl2pPr>
-            <a:lvl3pPr marL="685800" indent="0">
-              <a:buNone/>
-              <a:defRPr sz="1350" b="1"/>
+            <a:lvl3pPr marL="594360" indent="0">
+              <a:buNone/>
+              <a:defRPr sz="1170" b="1"/>
             </a:lvl3pPr>
-            <a:lvl4pPr marL="1028700" indent="0">
-              <a:buNone/>
-              <a:defRPr sz="1200" b="1"/>
+            <a:lvl4pPr marL="891540" indent="0">
+              <a:buNone/>
+              <a:defRPr sz="1040" b="1"/>
             </a:lvl4pPr>
-            <a:lvl5pPr marL="1371600" indent="0">
-              <a:buNone/>
-              <a:defRPr sz="1200" b="1"/>
+            <a:lvl5pPr marL="1188720" indent="0">
+              <a:buNone/>
+              <a:defRPr sz="1040" b="1"/>
             </a:lvl5pPr>
-            <a:lvl6pPr marL="1714500" indent="0">
-              <a:buNone/>
-              <a:defRPr sz="1200" b="1"/>
+            <a:lvl6pPr marL="1485900" indent="0">
+              <a:buNone/>
+              <a:defRPr sz="1040" b="1"/>
             </a:lvl6pPr>
-            <a:lvl7pPr marL="2057400" indent="0">
-              <a:buNone/>
-              <a:defRPr sz="1200" b="1"/>
+            <a:lvl7pPr marL="1783080" indent="0">
+              <a:buNone/>
+              <a:defRPr sz="1040" b="1"/>
             </a:lvl7pPr>
-            <a:lvl8pPr marL="2400300" indent="0">
-              <a:buNone/>
-              <a:defRPr sz="1200" b="1"/>
+            <a:lvl8pPr marL="2080260" indent="0">
+              <a:buNone/>
+              <a:defRPr sz="1040" b="1"/>
             </a:lvl8pPr>
-            <a:lvl9pPr marL="2743200" indent="0">
-              <a:buNone/>
-              <a:defRPr sz="1200" b="1"/>
+            <a:lvl9pPr marL="2377440" indent="0">
+              <a:buNone/>
+              <a:defRPr sz="1040" b="1"/>
             </a:lvl9pPr>
           </a:lstStyle>
           <a:p>
@@ -1539,8 +2404,8 @@
         </p:nvSpPr>
         <p:spPr>
           <a:xfrm>
-            <a:off x="3471863" y="2672080"/>
-            <a:ext cx="2915543" cy="3930227"/>
+            <a:off x="3008948" y="2672080"/>
+            <a:ext cx="2526804" cy="3930227"/>
           </a:xfrm>
         </p:spPr>
         <p:txBody>
@@ -1601,7 +2466,7 @@
           <a:p>
             <a:fld id="{7E773BE6-0A1E-D04A-93D4-644A66363E90}" type="datetimeFigureOut">
               <a:rPr lang="en-US" smtClean="0"/>
-              <a:t>8/29/23</a:t>
+              <a:t>8/30/23</a:t>
             </a:fld>
             <a:endParaRPr lang="en-US"/>
           </a:p>
@@ -1652,7 +2517,7 @@
     </p:spTree>
     <p:extLst>
       <p:ext uri="{BB962C8B-B14F-4D97-AF65-F5344CB8AC3E}">
-        <p14:creationId xmlns:p14="http://schemas.microsoft.com/office/powerpoint/2010/main" val="3065533319"/>
+        <p14:creationId xmlns:p14="http://schemas.microsoft.com/office/powerpoint/2010/main" val="472187342"/>
       </p:ext>
     </p:extLst>
   </p:cSld>
@@ -1719,7 +2584,7 @@
           <a:p>
             <a:fld id="{7E773BE6-0A1E-D04A-93D4-644A66363E90}" type="datetimeFigureOut">
               <a:rPr lang="en-US" smtClean="0"/>
-              <a:t>8/29/23</a:t>
+              <a:t>8/30/23</a:t>
             </a:fld>
             <a:endParaRPr lang="en-US"/>
           </a:p>
@@ -1770,7 +2635,7 @@
     </p:spTree>
     <p:extLst>
       <p:ext uri="{BB962C8B-B14F-4D97-AF65-F5344CB8AC3E}">
-        <p14:creationId xmlns:p14="http://schemas.microsoft.com/office/powerpoint/2010/main" val="3012653331"/>
+        <p14:creationId xmlns:p14="http://schemas.microsoft.com/office/powerpoint/2010/main" val="3238353615"/>
       </p:ext>
     </p:extLst>
   </p:cSld>
@@ -1814,7 +2679,7 @@
           <a:p>
             <a:fld id="{7E773BE6-0A1E-D04A-93D4-644A66363E90}" type="datetimeFigureOut">
               <a:rPr lang="en-US" smtClean="0"/>
-              <a:t>8/29/23</a:t>
+              <a:t>8/30/23</a:t>
             </a:fld>
             <a:endParaRPr lang="en-US"/>
           </a:p>
@@ -1865,7 +2730,7 @@
     </p:spTree>
     <p:extLst>
       <p:ext uri="{BB962C8B-B14F-4D97-AF65-F5344CB8AC3E}">
-        <p14:creationId xmlns:p14="http://schemas.microsoft.com/office/powerpoint/2010/main" val="2048347327"/>
+        <p14:creationId xmlns:p14="http://schemas.microsoft.com/office/powerpoint/2010/main" val="1425641742"/>
       </p:ext>
     </p:extLst>
   </p:cSld>
@@ -1904,15 +2769,15 @@
         </p:nvSpPr>
         <p:spPr>
           <a:xfrm>
-            <a:off x="472381" y="487680"/>
-            <a:ext cx="2211884" cy="1706880"/>
+            <a:off x="409397" y="487680"/>
+            <a:ext cx="1916966" cy="1706880"/>
           </a:xfrm>
         </p:spPr>
         <p:txBody>
           <a:bodyPr anchor="b"/>
           <a:lstStyle>
             <a:lvl1pPr>
-              <a:defRPr sz="2400"/>
+              <a:defRPr sz="2080"/>
             </a:lvl1pPr>
           </a:lstStyle>
           <a:p>
@@ -1936,39 +2801,39 @@
         </p:nvSpPr>
         <p:spPr>
           <a:xfrm>
-            <a:off x="2915543" y="1053255"/>
-            <a:ext cx="3471863" cy="5198533"/>
+            <a:off x="2526804" y="1053255"/>
+            <a:ext cx="3008948" cy="5198533"/>
           </a:xfrm>
         </p:spPr>
         <p:txBody>
           <a:bodyPr/>
           <a:lstStyle>
             <a:lvl1pPr>
-              <a:defRPr sz="2400"/>
+              <a:defRPr sz="2080"/>
             </a:lvl1pPr>
             <a:lvl2pPr>
-              <a:defRPr sz="2100"/>
+              <a:defRPr sz="1820"/>
             </a:lvl2pPr>
             <a:lvl3pPr>
-              <a:defRPr sz="1800"/>
+              <a:defRPr sz="1560"/>
             </a:lvl3pPr>
             <a:lvl4pPr>
-              <a:defRPr sz="1500"/>
+              <a:defRPr sz="1300"/>
             </a:lvl4pPr>
             <a:lvl5pPr>
-              <a:defRPr sz="1500"/>
+              <a:defRPr sz="1300"/>
             </a:lvl5pPr>
             <a:lvl6pPr>
-              <a:defRPr sz="1500"/>
+              <a:defRPr sz="1300"/>
             </a:lvl6pPr>
             <a:lvl7pPr>
-              <a:defRPr sz="1500"/>
+              <a:defRPr sz="1300"/>
             </a:lvl7pPr>
             <a:lvl8pPr>
-              <a:defRPr sz="1500"/>
+              <a:defRPr sz="1300"/>
             </a:lvl8pPr>
             <a:lvl9pPr>
-              <a:defRPr sz="1500"/>
+              <a:defRPr sz="1300"/>
             </a:lvl9pPr>
           </a:lstStyle>
           <a:p>
@@ -2021,8 +2886,8 @@
         </p:nvSpPr>
         <p:spPr>
           <a:xfrm>
-            <a:off x="472381" y="2194560"/>
-            <a:ext cx="2211884" cy="4065694"/>
+            <a:off x="409397" y="2194560"/>
+            <a:ext cx="1916966" cy="4065694"/>
           </a:xfrm>
         </p:spPr>
         <p:txBody>
@@ -2030,39 +2895,39 @@
           <a:lstStyle>
             <a:lvl1pPr marL="0" indent="0">
               <a:buNone/>
-              <a:defRPr sz="1200"/>
+              <a:defRPr sz="1040"/>
             </a:lvl1pPr>
-            <a:lvl2pPr marL="342900" indent="0">
-              <a:buNone/>
-              <a:defRPr sz="1050"/>
+            <a:lvl2pPr marL="297180" indent="0">
+              <a:buNone/>
+              <a:defRPr sz="910"/>
             </a:lvl2pPr>
-            <a:lvl3pPr marL="685800" indent="0">
-              <a:buNone/>
-              <a:defRPr sz="900"/>
+            <a:lvl3pPr marL="594360" indent="0">
+              <a:buNone/>
+              <a:defRPr sz="780"/>
             </a:lvl3pPr>
-            <a:lvl4pPr marL="1028700" indent="0">
-              <a:buNone/>
-              <a:defRPr sz="750"/>
+            <a:lvl4pPr marL="891540" indent="0">
+              <a:buNone/>
+              <a:defRPr sz="650"/>
             </a:lvl4pPr>
-            <a:lvl5pPr marL="1371600" indent="0">
-              <a:buNone/>
-              <a:defRPr sz="750"/>
+            <a:lvl5pPr marL="1188720" indent="0">
+              <a:buNone/>
+              <a:defRPr sz="650"/>
             </a:lvl5pPr>
-            <a:lvl6pPr marL="1714500" indent="0">
-              <a:buNone/>
-              <a:defRPr sz="750"/>
+            <a:lvl6pPr marL="1485900" indent="0">
+              <a:buNone/>
+              <a:defRPr sz="650"/>
             </a:lvl6pPr>
-            <a:lvl7pPr marL="2057400" indent="0">
-              <a:buNone/>
-              <a:defRPr sz="750"/>
+            <a:lvl7pPr marL="1783080" indent="0">
+              <a:buNone/>
+              <a:defRPr sz="650"/>
             </a:lvl7pPr>
-            <a:lvl8pPr marL="2400300" indent="0">
-              <a:buNone/>
-              <a:defRPr sz="750"/>
+            <a:lvl8pPr marL="2080260" indent="0">
+              <a:buNone/>
+              <a:defRPr sz="650"/>
             </a:lvl8pPr>
-            <a:lvl9pPr marL="2743200" indent="0">
-              <a:buNone/>
-              <a:defRPr sz="750"/>
+            <a:lvl9pPr marL="2377440" indent="0">
+              <a:buNone/>
+              <a:defRPr sz="650"/>
             </a:lvl9pPr>
           </a:lstStyle>
           <a:p>
@@ -2091,7 +2956,7 @@
           <a:p>
             <a:fld id="{7E773BE6-0A1E-D04A-93D4-644A66363E90}" type="datetimeFigureOut">
               <a:rPr lang="en-US" smtClean="0"/>
-              <a:t>8/29/23</a:t>
+              <a:t>8/30/23</a:t>
             </a:fld>
             <a:endParaRPr lang="en-US"/>
           </a:p>
@@ -2142,7 +3007,7 @@
     </p:spTree>
     <p:extLst>
       <p:ext uri="{BB962C8B-B14F-4D97-AF65-F5344CB8AC3E}">
-        <p14:creationId xmlns:p14="http://schemas.microsoft.com/office/powerpoint/2010/main" val="2168036541"/>
+        <p14:creationId xmlns:p14="http://schemas.microsoft.com/office/powerpoint/2010/main" val="1806573557"/>
       </p:ext>
     </p:extLst>
   </p:cSld>
@@ -2181,15 +3046,15 @@
         </p:nvSpPr>
         <p:spPr>
           <a:xfrm>
-            <a:off x="472381" y="487680"/>
-            <a:ext cx="2211884" cy="1706880"/>
+            <a:off x="409397" y="487680"/>
+            <a:ext cx="1916966" cy="1706880"/>
           </a:xfrm>
         </p:spPr>
         <p:txBody>
           <a:bodyPr anchor="b"/>
           <a:lstStyle>
             <a:lvl1pPr>
-              <a:defRPr sz="2400"/>
+              <a:defRPr sz="2080"/>
             </a:lvl1pPr>
           </a:lstStyle>
           <a:p>
@@ -2213,8 +3078,8 @@
         </p:nvSpPr>
         <p:spPr>
           <a:xfrm>
-            <a:off x="2915543" y="1053255"/>
-            <a:ext cx="3471863" cy="5198533"/>
+            <a:off x="2526804" y="1053255"/>
+            <a:ext cx="3008948" cy="5198533"/>
           </a:xfrm>
         </p:spPr>
         <p:txBody>
@@ -2222,39 +3087,39 @@
           <a:lstStyle>
             <a:lvl1pPr marL="0" indent="0">
               <a:buNone/>
-              <a:defRPr sz="2400"/>
+              <a:defRPr sz="2080"/>
             </a:lvl1pPr>
-            <a:lvl2pPr marL="342900" indent="0">
-              <a:buNone/>
-              <a:defRPr sz="2100"/>
+            <a:lvl2pPr marL="297180" indent="0">
+              <a:buNone/>
+              <a:defRPr sz="1820"/>
             </a:lvl2pPr>
-            <a:lvl3pPr marL="685800" indent="0">
-              <a:buNone/>
-              <a:defRPr sz="1800"/>
+            <a:lvl3pPr marL="594360" indent="0">
+              <a:buNone/>
+              <a:defRPr sz="1560"/>
             </a:lvl3pPr>
-            <a:lvl4pPr marL="1028700" indent="0">
-              <a:buNone/>
-              <a:defRPr sz="1500"/>
+            <a:lvl4pPr marL="891540" indent="0">
+              <a:buNone/>
+              <a:defRPr sz="1300"/>
             </a:lvl4pPr>
-            <a:lvl5pPr marL="1371600" indent="0">
-              <a:buNone/>
-              <a:defRPr sz="1500"/>
+            <a:lvl5pPr marL="1188720" indent="0">
+              <a:buNone/>
+              <a:defRPr sz="1300"/>
             </a:lvl5pPr>
-            <a:lvl6pPr marL="1714500" indent="0">
-              <a:buNone/>
-              <a:defRPr sz="1500"/>
+            <a:lvl6pPr marL="1485900" indent="0">
+              <a:buNone/>
+              <a:defRPr sz="1300"/>
             </a:lvl6pPr>
-            <a:lvl7pPr marL="2057400" indent="0">
-              <a:buNone/>
-              <a:defRPr sz="1500"/>
+            <a:lvl7pPr marL="1783080" indent="0">
+              <a:buNone/>
+              <a:defRPr sz="1300"/>
             </a:lvl7pPr>
-            <a:lvl8pPr marL="2400300" indent="0">
-              <a:buNone/>
-              <a:defRPr sz="1500"/>
+            <a:lvl8pPr marL="2080260" indent="0">
+              <a:buNone/>
+              <a:defRPr sz="1300"/>
             </a:lvl8pPr>
-            <a:lvl9pPr marL="2743200" indent="0">
-              <a:buNone/>
-              <a:defRPr sz="1500"/>
+            <a:lvl9pPr marL="2377440" indent="0">
+              <a:buNone/>
+              <a:defRPr sz="1300"/>
             </a:lvl9pPr>
           </a:lstStyle>
           <a:p>
@@ -2278,8 +3143,8 @@
         </p:nvSpPr>
         <p:spPr>
           <a:xfrm>
-            <a:off x="472381" y="2194560"/>
-            <a:ext cx="2211884" cy="4065694"/>
+            <a:off x="409397" y="2194560"/>
+            <a:ext cx="1916966" cy="4065694"/>
           </a:xfrm>
         </p:spPr>
         <p:txBody>
@@ -2287,39 +3152,39 @@
           <a:lstStyle>
             <a:lvl1pPr marL="0" indent="0">
               <a:buNone/>
-              <a:defRPr sz="1200"/>
+              <a:defRPr sz="1040"/>
             </a:lvl1pPr>
-            <a:lvl2pPr marL="342900" indent="0">
-              <a:buNone/>
-              <a:defRPr sz="1050"/>
+            <a:lvl2pPr marL="297180" indent="0">
+              <a:buNone/>
+              <a:defRPr sz="910"/>
             </a:lvl2pPr>
-            <a:lvl3pPr marL="685800" indent="0">
-              <a:buNone/>
-              <a:defRPr sz="900"/>
+            <a:lvl3pPr marL="594360" indent="0">
+              <a:buNone/>
+              <a:defRPr sz="780"/>
             </a:lvl3pPr>
-            <a:lvl4pPr marL="1028700" indent="0">
-              <a:buNone/>
-              <a:defRPr sz="750"/>
+            <a:lvl4pPr marL="891540" indent="0">
+              <a:buNone/>
+              <a:defRPr sz="650"/>
             </a:lvl4pPr>
-            <a:lvl5pPr marL="1371600" indent="0">
-              <a:buNone/>
-              <a:defRPr sz="750"/>
+            <a:lvl5pPr marL="1188720" indent="0">
+              <a:buNone/>
+              <a:defRPr sz="650"/>
             </a:lvl5pPr>
-            <a:lvl6pPr marL="1714500" indent="0">
-              <a:buNone/>
-              <a:defRPr sz="750"/>
+            <a:lvl6pPr marL="1485900" indent="0">
+              <a:buNone/>
+              <a:defRPr sz="650"/>
             </a:lvl6pPr>
-            <a:lvl7pPr marL="2057400" indent="0">
-              <a:buNone/>
-              <a:defRPr sz="750"/>
+            <a:lvl7pPr marL="1783080" indent="0">
+              <a:buNone/>
+              <a:defRPr sz="650"/>
             </a:lvl7pPr>
-            <a:lvl8pPr marL="2400300" indent="0">
-              <a:buNone/>
-              <a:defRPr sz="750"/>
+            <a:lvl8pPr marL="2080260" indent="0">
+              <a:buNone/>
+              <a:defRPr sz="650"/>
             </a:lvl8pPr>
-            <a:lvl9pPr marL="2743200" indent="0">
-              <a:buNone/>
-              <a:defRPr sz="750"/>
+            <a:lvl9pPr marL="2377440" indent="0">
+              <a:buNone/>
+              <a:defRPr sz="650"/>
             </a:lvl9pPr>
           </a:lstStyle>
           <a:p>
@@ -2348,7 +3213,7 @@
           <a:p>
             <a:fld id="{7E773BE6-0A1E-D04A-93D4-644A66363E90}" type="datetimeFigureOut">
               <a:rPr lang="en-US" smtClean="0"/>
-              <a:t>8/29/23</a:t>
+              <a:t>8/30/23</a:t>
             </a:fld>
             <a:endParaRPr lang="en-US"/>
           </a:p>
@@ -2399,7 +3264,7 @@
     </p:spTree>
     <p:extLst>
       <p:ext uri="{BB962C8B-B14F-4D97-AF65-F5344CB8AC3E}">
-        <p14:creationId xmlns:p14="http://schemas.microsoft.com/office/powerpoint/2010/main" val="1643828127"/>
+        <p14:creationId xmlns:p14="http://schemas.microsoft.com/office/powerpoint/2010/main" val="1392216826"/>
       </p:ext>
     </p:extLst>
   </p:cSld>
@@ -2443,8 +3308,8 @@
         </p:nvSpPr>
         <p:spPr>
           <a:xfrm>
-            <a:off x="471488" y="389468"/>
-            <a:ext cx="5915025" cy="1413934"/>
+            <a:off x="408623" y="389468"/>
+            <a:ext cx="5126355" cy="1413934"/>
           </a:xfrm>
           <a:prstGeom prst="rect">
             <a:avLst/>
@@ -2476,8 +3341,8 @@
         </p:nvSpPr>
         <p:spPr>
           <a:xfrm>
-            <a:off x="471488" y="1947333"/>
-            <a:ext cx="5915025" cy="4641427"/>
+            <a:off x="408623" y="1947333"/>
+            <a:ext cx="5126355" cy="4641427"/>
           </a:xfrm>
           <a:prstGeom prst="rect">
             <a:avLst/>
@@ -2538,8 +3403,8 @@
         </p:nvSpPr>
         <p:spPr>
           <a:xfrm>
-            <a:off x="471487" y="6780108"/>
-            <a:ext cx="1543050" cy="389467"/>
+            <a:off x="408622" y="6780108"/>
+            <a:ext cx="1337310" cy="389467"/>
           </a:xfrm>
           <a:prstGeom prst="rect">
             <a:avLst/>
@@ -2549,7 +3414,7 @@
           <a:bodyPr vert="horz" lIns="91440" tIns="45720" rIns="91440" bIns="45720" rtlCol="0" anchor="ctr"/>
           <a:lstStyle>
             <a:lvl1pPr algn="l">
-              <a:defRPr sz="900">
+              <a:defRPr sz="780">
                 <a:solidFill>
                   <a:schemeClr val="tx1">
                     <a:tint val="75000"/>
@@ -2561,7 +3426,7 @@
           <a:p>
             <a:fld id="{7E773BE6-0A1E-D04A-93D4-644A66363E90}" type="datetimeFigureOut">
               <a:rPr lang="en-US" smtClean="0"/>
-              <a:t>8/29/23</a:t>
+              <a:t>8/30/23</a:t>
             </a:fld>
             <a:endParaRPr lang="en-US"/>
           </a:p>
@@ -2579,8 +3444,8 @@
         </p:nvSpPr>
         <p:spPr>
           <a:xfrm>
-            <a:off x="2271713" y="6780108"/>
-            <a:ext cx="2314575" cy="389467"/>
+            <a:off x="1968818" y="6780108"/>
+            <a:ext cx="2005965" cy="389467"/>
           </a:xfrm>
           <a:prstGeom prst="rect">
             <a:avLst/>
@@ -2590,7 +3455,7 @@
           <a:bodyPr vert="horz" lIns="91440" tIns="45720" rIns="91440" bIns="45720" rtlCol="0" anchor="ctr"/>
           <a:lstStyle>
             <a:lvl1pPr algn="ctr">
-              <a:defRPr sz="900">
+              <a:defRPr sz="780">
                 <a:solidFill>
                   <a:schemeClr val="tx1">
                     <a:tint val="75000"/>
@@ -2616,8 +3481,8 @@
         </p:nvSpPr>
         <p:spPr>
           <a:xfrm>
-            <a:off x="4843463" y="6780108"/>
-            <a:ext cx="1543050" cy="389467"/>
+            <a:off x="4197668" y="6780108"/>
+            <a:ext cx="1337310" cy="389467"/>
           </a:xfrm>
           <a:prstGeom prst="rect">
             <a:avLst/>
@@ -2627,7 +3492,7 @@
           <a:bodyPr vert="horz" lIns="91440" tIns="45720" rIns="91440" bIns="45720" rtlCol="0" anchor="ctr"/>
           <a:lstStyle>
             <a:lvl1pPr algn="r">
-              <a:defRPr sz="900">
+              <a:defRPr sz="780">
                 <a:solidFill>
                   <a:schemeClr val="tx1">
                     <a:tint val="75000"/>
@@ -2648,27 +3513,27 @@
     </p:spTree>
     <p:extLst>
       <p:ext uri="{BB962C8B-B14F-4D97-AF65-F5344CB8AC3E}">
-        <p14:creationId xmlns:p14="http://schemas.microsoft.com/office/powerpoint/2010/main" val="3937815069"/>
+        <p14:creationId xmlns:p14="http://schemas.microsoft.com/office/powerpoint/2010/main" val="3463236738"/>
       </p:ext>
     </p:extLst>
   </p:cSld>
   <p:clrMap bg1="lt1" tx1="dk1" bg2="lt2" tx2="dk2" accent1="accent1" accent2="accent2" accent3="accent3" accent4="accent4" accent5="accent5" accent6="accent6" hlink="hlink" folHlink="folHlink"/>
   <p:sldLayoutIdLst>
-    <p:sldLayoutId id="2147483673" r:id="rId1"/>
-    <p:sldLayoutId id="2147483674" r:id="rId2"/>
-    <p:sldLayoutId id="2147483675" r:id="rId3"/>
-    <p:sldLayoutId id="2147483676" r:id="rId4"/>
-    <p:sldLayoutId id="2147483677" r:id="rId5"/>
-    <p:sldLayoutId id="2147483678" r:id="rId6"/>
-    <p:sldLayoutId id="2147483679" r:id="rId7"/>
-    <p:sldLayoutId id="2147483680" r:id="rId8"/>
-    <p:sldLayoutId id="2147483681" r:id="rId9"/>
-    <p:sldLayoutId id="2147483682" r:id="rId10"/>
-    <p:sldLayoutId id="2147483683" r:id="rId11"/>
+    <p:sldLayoutId id="2147483697" r:id="rId1"/>
+    <p:sldLayoutId id="2147483698" r:id="rId2"/>
+    <p:sldLayoutId id="2147483699" r:id="rId3"/>
+    <p:sldLayoutId id="2147483700" r:id="rId4"/>
+    <p:sldLayoutId id="2147483701" r:id="rId5"/>
+    <p:sldLayoutId id="2147483702" r:id="rId6"/>
+    <p:sldLayoutId id="2147483703" r:id="rId7"/>
+    <p:sldLayoutId id="2147483704" r:id="rId8"/>
+    <p:sldLayoutId id="2147483705" r:id="rId9"/>
+    <p:sldLayoutId id="2147483706" r:id="rId10"/>
+    <p:sldLayoutId id="2147483707" r:id="rId11"/>
   </p:sldLayoutIdLst>
   <p:txStyles>
     <p:titleStyle>
-      <a:lvl1pPr algn="l" defTabSz="685800" rtl="0" eaLnBrk="1" latinLnBrk="0" hangingPunct="1">
+      <a:lvl1pPr algn="l" defTabSz="594360" rtl="0" eaLnBrk="1" latinLnBrk="0" hangingPunct="1">
         <a:lnSpc>
           <a:spcPct val="90000"/>
         </a:lnSpc>
@@ -2676,7 +3541,7 @@
           <a:spcPct val="0"/>
         </a:spcBef>
         <a:buNone/>
-        <a:defRPr sz="3300" kern="1200">
+        <a:defRPr sz="2860" kern="1200">
           <a:solidFill>
             <a:schemeClr val="tx1"/>
           </a:solidFill>
@@ -2687,16 +3552,16 @@
       </a:lvl1pPr>
     </p:titleStyle>
     <p:bodyStyle>
-      <a:lvl1pPr marL="171450" indent="-171450" algn="l" defTabSz="685800" rtl="0" eaLnBrk="1" latinLnBrk="0" hangingPunct="1">
+      <a:lvl1pPr marL="148590" indent="-148590" algn="l" defTabSz="594360" rtl="0" eaLnBrk="1" latinLnBrk="0" hangingPunct="1">
         <a:lnSpc>
           <a:spcPct val="90000"/>
         </a:lnSpc>
         <a:spcBef>
-          <a:spcPts val="750"/>
+          <a:spcPts val="650"/>
         </a:spcBef>
         <a:buFont typeface="Arial" panose="020B0604020202020204" pitchFamily="34" charset="0"/>
         <a:buChar char="•"/>
-        <a:defRPr sz="2100" kern="1200">
+        <a:defRPr sz="1820" kern="1200">
           <a:solidFill>
             <a:schemeClr val="tx1"/>
           </a:solidFill>
@@ -2705,16 +3570,16 @@
           <a:cs typeface="+mn-cs"/>
         </a:defRPr>
       </a:lvl1pPr>
-      <a:lvl2pPr marL="514350" indent="-171450" algn="l" defTabSz="685800" rtl="0" eaLnBrk="1" latinLnBrk="0" hangingPunct="1">
+      <a:lvl2pPr marL="445770" indent="-148590" algn="l" defTabSz="594360" rtl="0" eaLnBrk="1" latinLnBrk="0" hangingPunct="1">
         <a:lnSpc>
           <a:spcPct val="90000"/>
         </a:lnSpc>
         <a:spcBef>
-          <a:spcPts val="375"/>
+          <a:spcPts val="325"/>
         </a:spcBef>
         <a:buFont typeface="Arial" panose="020B0604020202020204" pitchFamily="34" charset="0"/>
         <a:buChar char="•"/>
-        <a:defRPr sz="1800" kern="1200">
+        <a:defRPr sz="1560" kern="1200">
           <a:solidFill>
             <a:schemeClr val="tx1"/>
           </a:solidFill>
@@ -2723,16 +3588,16 @@
           <a:cs typeface="+mn-cs"/>
         </a:defRPr>
       </a:lvl2pPr>
-      <a:lvl3pPr marL="857250" indent="-171450" algn="l" defTabSz="685800" rtl="0" eaLnBrk="1" latinLnBrk="0" hangingPunct="1">
+      <a:lvl3pPr marL="742950" indent="-148590" algn="l" defTabSz="594360" rtl="0" eaLnBrk="1" latinLnBrk="0" hangingPunct="1">
         <a:lnSpc>
           <a:spcPct val="90000"/>
         </a:lnSpc>
         <a:spcBef>
-          <a:spcPts val="375"/>
+          <a:spcPts val="325"/>
         </a:spcBef>
         <a:buFont typeface="Arial" panose="020B0604020202020204" pitchFamily="34" charset="0"/>
         <a:buChar char="•"/>
-        <a:defRPr sz="1500" kern="1200">
+        <a:defRPr sz="1300" kern="1200">
           <a:solidFill>
             <a:schemeClr val="tx1"/>
           </a:solidFill>
@@ -2741,16 +3606,16 @@
           <a:cs typeface="+mn-cs"/>
         </a:defRPr>
       </a:lvl3pPr>
-      <a:lvl4pPr marL="1200150" indent="-171450" algn="l" defTabSz="685800" rtl="0" eaLnBrk="1" latinLnBrk="0" hangingPunct="1">
+      <a:lvl4pPr marL="1040130" indent="-148590" algn="l" defTabSz="594360" rtl="0" eaLnBrk="1" latinLnBrk="0" hangingPunct="1">
         <a:lnSpc>
           <a:spcPct val="90000"/>
         </a:lnSpc>
         <a:spcBef>
-          <a:spcPts val="375"/>
+          <a:spcPts val="325"/>
         </a:spcBef>
         <a:buFont typeface="Arial" panose="020B0604020202020204" pitchFamily="34" charset="0"/>
         <a:buChar char="•"/>
-        <a:defRPr sz="1350" kern="1200">
+        <a:defRPr sz="1170" kern="1200">
           <a:solidFill>
             <a:schemeClr val="tx1"/>
           </a:solidFill>
@@ -2759,16 +3624,16 @@
           <a:cs typeface="+mn-cs"/>
         </a:defRPr>
       </a:lvl4pPr>
-      <a:lvl5pPr marL="1543050" indent="-171450" algn="l" defTabSz="685800" rtl="0" eaLnBrk="1" latinLnBrk="0" hangingPunct="1">
+      <a:lvl5pPr marL="1337310" indent="-148590" algn="l" defTabSz="594360" rtl="0" eaLnBrk="1" latinLnBrk="0" hangingPunct="1">
         <a:lnSpc>
           <a:spcPct val="90000"/>
         </a:lnSpc>
         <a:spcBef>
-          <a:spcPts val="375"/>
+          <a:spcPts val="325"/>
         </a:spcBef>
         <a:buFont typeface="Arial" panose="020B0604020202020204" pitchFamily="34" charset="0"/>
         <a:buChar char="•"/>
-        <a:defRPr sz="1350" kern="1200">
+        <a:defRPr sz="1170" kern="1200">
           <a:solidFill>
             <a:schemeClr val="tx1"/>
           </a:solidFill>
@@ -2777,16 +3642,16 @@
           <a:cs typeface="+mn-cs"/>
         </a:defRPr>
       </a:lvl5pPr>
-      <a:lvl6pPr marL="1885950" indent="-171450" algn="l" defTabSz="685800" rtl="0" eaLnBrk="1" latinLnBrk="0" hangingPunct="1">
+      <a:lvl6pPr marL="1634490" indent="-148590" algn="l" defTabSz="594360" rtl="0" eaLnBrk="1" latinLnBrk="0" hangingPunct="1">
         <a:lnSpc>
           <a:spcPct val="90000"/>
         </a:lnSpc>
         <a:spcBef>
-          <a:spcPts val="375"/>
+          <a:spcPts val="325"/>
         </a:spcBef>
         <a:buFont typeface="Arial" panose="020B0604020202020204" pitchFamily="34" charset="0"/>
         <a:buChar char="•"/>
-        <a:defRPr sz="1350" kern="1200">
+        <a:defRPr sz="1170" kern="1200">
           <a:solidFill>
             <a:schemeClr val="tx1"/>
           </a:solidFill>
@@ -2795,16 +3660,16 @@
           <a:cs typeface="+mn-cs"/>
         </a:defRPr>
       </a:lvl6pPr>
-      <a:lvl7pPr marL="2228850" indent="-171450" algn="l" defTabSz="685800" rtl="0" eaLnBrk="1" latinLnBrk="0" hangingPunct="1">
+      <a:lvl7pPr marL="1931670" indent="-148590" algn="l" defTabSz="594360" rtl="0" eaLnBrk="1" latinLnBrk="0" hangingPunct="1">
         <a:lnSpc>
           <a:spcPct val="90000"/>
         </a:lnSpc>
         <a:spcBef>
-          <a:spcPts val="375"/>
+          <a:spcPts val="325"/>
         </a:spcBef>
         <a:buFont typeface="Arial" panose="020B0604020202020204" pitchFamily="34" charset="0"/>
         <a:buChar char="•"/>
-        <a:defRPr sz="1350" kern="1200">
+        <a:defRPr sz="1170" kern="1200">
           <a:solidFill>
             <a:schemeClr val="tx1"/>
           </a:solidFill>
@@ -2813,16 +3678,16 @@
           <a:cs typeface="+mn-cs"/>
         </a:defRPr>
       </a:lvl7pPr>
-      <a:lvl8pPr marL="2571750" indent="-171450" algn="l" defTabSz="685800" rtl="0" eaLnBrk="1" latinLnBrk="0" hangingPunct="1">
+      <a:lvl8pPr marL="2228850" indent="-148590" algn="l" defTabSz="594360" rtl="0" eaLnBrk="1" latinLnBrk="0" hangingPunct="1">
         <a:lnSpc>
           <a:spcPct val="90000"/>
         </a:lnSpc>
         <a:spcBef>
-          <a:spcPts val="375"/>
+          <a:spcPts val="325"/>
         </a:spcBef>
         <a:buFont typeface="Arial" panose="020B0604020202020204" pitchFamily="34" charset="0"/>
         <a:buChar char="•"/>
-        <a:defRPr sz="1350" kern="1200">
+        <a:defRPr sz="1170" kern="1200">
           <a:solidFill>
             <a:schemeClr val="tx1"/>
           </a:solidFill>
@@ -2831,16 +3696,16 @@
           <a:cs typeface="+mn-cs"/>
         </a:defRPr>
       </a:lvl8pPr>
-      <a:lvl9pPr marL="2914650" indent="-171450" algn="l" defTabSz="685800" rtl="0" eaLnBrk="1" latinLnBrk="0" hangingPunct="1">
+      <a:lvl9pPr marL="2526030" indent="-148590" algn="l" defTabSz="594360" rtl="0" eaLnBrk="1" latinLnBrk="0" hangingPunct="1">
         <a:lnSpc>
           <a:spcPct val="90000"/>
         </a:lnSpc>
         <a:spcBef>
-          <a:spcPts val="375"/>
+          <a:spcPts val="325"/>
         </a:spcBef>
         <a:buFont typeface="Arial" panose="020B0604020202020204" pitchFamily="34" charset="0"/>
         <a:buChar char="•"/>
-        <a:defRPr sz="1350" kern="1200">
+        <a:defRPr sz="1170" kern="1200">
           <a:solidFill>
             <a:schemeClr val="tx1"/>
           </a:solidFill>
@@ -2854,8 +3719,8 @@
       <a:defPPr>
         <a:defRPr lang="en-US"/>
       </a:defPPr>
-      <a:lvl1pPr marL="0" algn="l" defTabSz="685800" rtl="0" eaLnBrk="1" latinLnBrk="0" hangingPunct="1">
-        <a:defRPr sz="1350" kern="1200">
+      <a:lvl1pPr marL="0" algn="l" defTabSz="594360" rtl="0" eaLnBrk="1" latinLnBrk="0" hangingPunct="1">
+        <a:defRPr sz="1170" kern="1200">
           <a:solidFill>
             <a:schemeClr val="tx1"/>
           </a:solidFill>
@@ -2864,8 +3729,8 @@
           <a:cs typeface="+mn-cs"/>
         </a:defRPr>
       </a:lvl1pPr>
-      <a:lvl2pPr marL="342900" algn="l" defTabSz="685800" rtl="0" eaLnBrk="1" latinLnBrk="0" hangingPunct="1">
-        <a:defRPr sz="1350" kern="1200">
+      <a:lvl2pPr marL="297180" algn="l" defTabSz="594360" rtl="0" eaLnBrk="1" latinLnBrk="0" hangingPunct="1">
+        <a:defRPr sz="1170" kern="1200">
           <a:solidFill>
             <a:schemeClr val="tx1"/>
           </a:solidFill>
@@ -2874,8 +3739,8 @@
           <a:cs typeface="+mn-cs"/>
         </a:defRPr>
       </a:lvl2pPr>
-      <a:lvl3pPr marL="685800" algn="l" defTabSz="685800" rtl="0" eaLnBrk="1" latinLnBrk="0" hangingPunct="1">
-        <a:defRPr sz="1350" kern="1200">
+      <a:lvl3pPr marL="594360" algn="l" defTabSz="594360" rtl="0" eaLnBrk="1" latinLnBrk="0" hangingPunct="1">
+        <a:defRPr sz="1170" kern="1200">
           <a:solidFill>
             <a:schemeClr val="tx1"/>
           </a:solidFill>
@@ -2884,8 +3749,8 @@
           <a:cs typeface="+mn-cs"/>
         </a:defRPr>
       </a:lvl3pPr>
-      <a:lvl4pPr marL="1028700" algn="l" defTabSz="685800" rtl="0" eaLnBrk="1" latinLnBrk="0" hangingPunct="1">
-        <a:defRPr sz="1350" kern="1200">
+      <a:lvl4pPr marL="891540" algn="l" defTabSz="594360" rtl="0" eaLnBrk="1" latinLnBrk="0" hangingPunct="1">
+        <a:defRPr sz="1170" kern="1200">
           <a:solidFill>
             <a:schemeClr val="tx1"/>
           </a:solidFill>
@@ -2894,8 +3759,8 @@
           <a:cs typeface="+mn-cs"/>
         </a:defRPr>
       </a:lvl4pPr>
-      <a:lvl5pPr marL="1371600" algn="l" defTabSz="685800" rtl="0" eaLnBrk="1" latinLnBrk="0" hangingPunct="1">
-        <a:defRPr sz="1350" kern="1200">
+      <a:lvl5pPr marL="1188720" algn="l" defTabSz="594360" rtl="0" eaLnBrk="1" latinLnBrk="0" hangingPunct="1">
+        <a:defRPr sz="1170" kern="1200">
           <a:solidFill>
             <a:schemeClr val="tx1"/>
           </a:solidFill>
@@ -2904,8 +3769,8 @@
           <a:cs typeface="+mn-cs"/>
         </a:defRPr>
       </a:lvl5pPr>
-      <a:lvl6pPr marL="1714500" algn="l" defTabSz="685800" rtl="0" eaLnBrk="1" latinLnBrk="0" hangingPunct="1">
-        <a:defRPr sz="1350" kern="1200">
+      <a:lvl6pPr marL="1485900" algn="l" defTabSz="594360" rtl="0" eaLnBrk="1" latinLnBrk="0" hangingPunct="1">
+        <a:defRPr sz="1170" kern="1200">
           <a:solidFill>
             <a:schemeClr val="tx1"/>
           </a:solidFill>
@@ -2914,8 +3779,8 @@
           <a:cs typeface="+mn-cs"/>
         </a:defRPr>
       </a:lvl6pPr>
-      <a:lvl7pPr marL="2057400" algn="l" defTabSz="685800" rtl="0" eaLnBrk="1" latinLnBrk="0" hangingPunct="1">
-        <a:defRPr sz="1350" kern="1200">
+      <a:lvl7pPr marL="1783080" algn="l" defTabSz="594360" rtl="0" eaLnBrk="1" latinLnBrk="0" hangingPunct="1">
+        <a:defRPr sz="1170" kern="1200">
           <a:solidFill>
             <a:schemeClr val="tx1"/>
           </a:solidFill>
@@ -2924,8 +3789,8 @@
           <a:cs typeface="+mn-cs"/>
         </a:defRPr>
       </a:lvl7pPr>
-      <a:lvl8pPr marL="2400300" algn="l" defTabSz="685800" rtl="0" eaLnBrk="1" latinLnBrk="0" hangingPunct="1">
-        <a:defRPr sz="1350" kern="1200">
+      <a:lvl8pPr marL="2080260" algn="l" defTabSz="594360" rtl="0" eaLnBrk="1" latinLnBrk="0" hangingPunct="1">
+        <a:defRPr sz="1170" kern="1200">
           <a:solidFill>
             <a:schemeClr val="tx1"/>
           </a:solidFill>
@@ -2934,8 +3799,8 @@
           <a:cs typeface="+mn-cs"/>
         </a:defRPr>
       </a:lvl8pPr>
-      <a:lvl9pPr marL="2743200" algn="l" defTabSz="685800" rtl="0" eaLnBrk="1" latinLnBrk="0" hangingPunct="1">
-        <a:defRPr sz="1350" kern="1200">
+      <a:lvl9pPr marL="2377440" algn="l" defTabSz="594360" rtl="0" eaLnBrk="1" latinLnBrk="0" hangingPunct="1">
+        <a:defRPr sz="1170" kern="1200">
           <a:solidFill>
             <a:schemeClr val="tx1"/>
           </a:solidFill>
@@ -2968,10 +3833,10 @@
       </p:grpSpPr>
       <p:grpSp>
         <p:nvGrpSpPr>
-          <p:cNvPr id="24" name="Group 23">
+          <p:cNvPr id="45" name="Group 44">
             <a:extLst>
               <a:ext uri="{FF2B5EF4-FFF2-40B4-BE49-F238E27FC236}">
-                <a16:creationId xmlns:a16="http://schemas.microsoft.com/office/drawing/2014/main" id="{B3F1F6C3-5606-F2A7-FB87-B4F7C4541FB0}"/>
+                <a16:creationId xmlns:a16="http://schemas.microsoft.com/office/drawing/2014/main" id="{41C23E74-FDF0-2B40-43FB-3811CB15C600}"/>
               </a:ext>
             </a:extLst>
           </p:cNvPr>
@@ -2980,18 +3845,863 @@
         </p:nvGrpSpPr>
         <p:grpSpPr>
           <a:xfrm>
-            <a:off x="-627148" y="0"/>
-            <a:ext cx="8309679" cy="7245752"/>
-            <a:chOff x="-627148" y="0"/>
-            <a:chExt cx="8309679" cy="7245752"/>
+            <a:off x="-731902" y="-10684"/>
+            <a:ext cx="7753202" cy="7282097"/>
+            <a:chOff x="-731902" y="-10684"/>
+            <a:chExt cx="7753202" cy="7282097"/>
           </a:xfrm>
         </p:grpSpPr>
+        <p:grpSp>
+          <p:nvGrpSpPr>
+            <p:cNvPr id="42" name="Group 41">
+              <a:extLst>
+                <a:ext uri="{FF2B5EF4-FFF2-40B4-BE49-F238E27FC236}">
+                  <a16:creationId xmlns:a16="http://schemas.microsoft.com/office/drawing/2014/main" id="{5979B789-1E96-9961-CB66-BBD9DF84B2F3}"/>
+                </a:ext>
+              </a:extLst>
+            </p:cNvPr>
+            <p:cNvGrpSpPr/>
+            <p:nvPr/>
+          </p:nvGrpSpPr>
+          <p:grpSpPr>
+            <a:xfrm>
+              <a:off x="-731902" y="-10684"/>
+              <a:ext cx="6598416" cy="7282097"/>
+              <a:chOff x="-731902" y="-10684"/>
+              <a:chExt cx="6598416" cy="7282097"/>
+            </a:xfrm>
+          </p:grpSpPr>
+          <p:pic>
+            <p:nvPicPr>
+              <p:cNvPr id="5" name="Picture 4" descr="A map of the united states with different colored dots&#10;&#10;Description automatically generated">
+                <a:extLst>
+                  <a:ext uri="{FF2B5EF4-FFF2-40B4-BE49-F238E27FC236}">
+                    <a16:creationId xmlns:a16="http://schemas.microsoft.com/office/drawing/2014/main" id="{39E164EF-881E-0794-1307-6EEFF0FFBAB1}"/>
+                  </a:ext>
+                </a:extLst>
+              </p:cNvPr>
+              <p:cNvPicPr>
+                <a:picLocks noChangeAspect="1"/>
+              </p:cNvPicPr>
+              <p:nvPr/>
+            </p:nvPicPr>
+            <p:blipFill>
+              <a:blip r:embed="rId2"/>
+              <a:stretch>
+                <a:fillRect/>
+              </a:stretch>
+            </p:blipFill>
+            <p:spPr>
+              <a:xfrm>
+                <a:off x="48474" y="-10684"/>
+                <a:ext cx="5818040" cy="3597413"/>
+              </a:xfrm>
+              <a:prstGeom prst="rect">
+                <a:avLst/>
+              </a:prstGeom>
+            </p:spPr>
+          </p:pic>
+          <p:sp>
+            <p:nvSpPr>
+              <p:cNvPr id="4" name="TextBox 3">
+                <a:extLst>
+                  <a:ext uri="{FF2B5EF4-FFF2-40B4-BE49-F238E27FC236}">
+                    <a16:creationId xmlns:a16="http://schemas.microsoft.com/office/drawing/2014/main" id="{ADC42F44-5573-2ED6-4D34-A1389B41BAFD}"/>
+                  </a:ext>
+                </a:extLst>
+              </p:cNvPr>
+              <p:cNvSpPr txBox="1"/>
+              <p:nvPr/>
+            </p:nvSpPr>
+            <p:spPr>
+              <a:xfrm>
+                <a:off x="151316" y="92368"/>
+                <a:ext cx="389850" cy="276999"/>
+              </a:xfrm>
+              <a:prstGeom prst="rect">
+                <a:avLst/>
+              </a:prstGeom>
+              <a:noFill/>
+            </p:spPr>
+            <p:txBody>
+              <a:bodyPr wrap="none" rtlCol="0">
+                <a:spAutoFit/>
+              </a:bodyPr>
+              <a:lstStyle/>
+              <a:p>
+                <a:r>
+                  <a:rPr lang="en-US" sz="1200" dirty="0">
+                    <a:latin typeface="Helvetica" pitchFamily="2" charset="0"/>
+                  </a:rPr>
+                  <a:t>(A)</a:t>
+                </a:r>
+              </a:p>
+            </p:txBody>
+          </p:sp>
+          <p:sp>
+            <p:nvSpPr>
+              <p:cNvPr id="6" name="TextBox 5">
+                <a:extLst>
+                  <a:ext uri="{FF2B5EF4-FFF2-40B4-BE49-F238E27FC236}">
+                    <a16:creationId xmlns:a16="http://schemas.microsoft.com/office/drawing/2014/main" id="{172DA89F-0CA6-171A-F5BC-EC15A3237041}"/>
+                  </a:ext>
+                </a:extLst>
+              </p:cNvPr>
+              <p:cNvSpPr txBox="1"/>
+              <p:nvPr/>
+            </p:nvSpPr>
+            <p:spPr>
+              <a:xfrm>
+                <a:off x="159059" y="3666480"/>
+                <a:ext cx="389850" cy="276999"/>
+              </a:xfrm>
+              <a:prstGeom prst="rect">
+                <a:avLst/>
+              </a:prstGeom>
+              <a:noFill/>
+            </p:spPr>
+            <p:txBody>
+              <a:bodyPr wrap="none" rtlCol="0">
+                <a:spAutoFit/>
+              </a:bodyPr>
+              <a:lstStyle/>
+              <a:p>
+                <a:r>
+                  <a:rPr lang="en-US" sz="1200" dirty="0">
+                    <a:latin typeface="Helvetica" pitchFamily="2" charset="0"/>
+                  </a:rPr>
+                  <a:t>(B)</a:t>
+                </a:r>
+              </a:p>
+            </p:txBody>
+          </p:sp>
+          <p:sp>
+            <p:nvSpPr>
+              <p:cNvPr id="7" name="TextBox 6">
+                <a:extLst>
+                  <a:ext uri="{FF2B5EF4-FFF2-40B4-BE49-F238E27FC236}">
+                    <a16:creationId xmlns:a16="http://schemas.microsoft.com/office/drawing/2014/main" id="{98C125B5-A1AF-C6E1-2E50-18C860451843}"/>
+                  </a:ext>
+                </a:extLst>
+              </p:cNvPr>
+              <p:cNvSpPr txBox="1"/>
+              <p:nvPr/>
+            </p:nvSpPr>
+            <p:spPr>
+              <a:xfrm>
+                <a:off x="2312086" y="3661590"/>
+                <a:ext cx="397866" cy="276999"/>
+              </a:xfrm>
+              <a:prstGeom prst="rect">
+                <a:avLst/>
+              </a:prstGeom>
+              <a:noFill/>
+            </p:spPr>
+            <p:txBody>
+              <a:bodyPr wrap="none" rtlCol="0">
+                <a:spAutoFit/>
+              </a:bodyPr>
+              <a:lstStyle/>
+              <a:p>
+                <a:r>
+                  <a:rPr lang="en-US" sz="1200" dirty="0">
+                    <a:latin typeface="Helvetica" pitchFamily="2" charset="0"/>
+                  </a:rPr>
+                  <a:t>(C)</a:t>
+                </a:r>
+              </a:p>
+            </p:txBody>
+          </p:sp>
+          <p:sp>
+            <p:nvSpPr>
+              <p:cNvPr id="8" name="TextBox 7">
+                <a:extLst>
+                  <a:ext uri="{FF2B5EF4-FFF2-40B4-BE49-F238E27FC236}">
+                    <a16:creationId xmlns:a16="http://schemas.microsoft.com/office/drawing/2014/main" id="{D84F4EF2-0EA1-14E6-4667-FB851AEDF9E8}"/>
+                  </a:ext>
+                </a:extLst>
+              </p:cNvPr>
+              <p:cNvSpPr txBox="1"/>
+              <p:nvPr/>
+            </p:nvSpPr>
+            <p:spPr>
+              <a:xfrm>
+                <a:off x="4056575" y="3661590"/>
+                <a:ext cx="397866" cy="276999"/>
+              </a:xfrm>
+              <a:prstGeom prst="rect">
+                <a:avLst/>
+              </a:prstGeom>
+              <a:noFill/>
+            </p:spPr>
+            <p:txBody>
+              <a:bodyPr wrap="none" rtlCol="0">
+                <a:spAutoFit/>
+              </a:bodyPr>
+              <a:lstStyle/>
+              <a:p>
+                <a:r>
+                  <a:rPr lang="en-US" sz="1200" dirty="0">
+                    <a:latin typeface="Helvetica" pitchFamily="2" charset="0"/>
+                  </a:rPr>
+                  <a:t>(D)</a:t>
+                </a:r>
+              </a:p>
+            </p:txBody>
+          </p:sp>
+          <p:sp>
+            <p:nvSpPr>
+              <p:cNvPr id="9" name="TextBox 8">
+                <a:extLst>
+                  <a:ext uri="{FF2B5EF4-FFF2-40B4-BE49-F238E27FC236}">
+                    <a16:creationId xmlns:a16="http://schemas.microsoft.com/office/drawing/2014/main" id="{47AAA2C0-65FB-8C39-B8D8-9691E5F0CB02}"/>
+                  </a:ext>
+                </a:extLst>
+              </p:cNvPr>
+              <p:cNvSpPr txBox="1"/>
+              <p:nvPr/>
+            </p:nvSpPr>
+            <p:spPr>
+              <a:xfrm>
+                <a:off x="414948" y="3706215"/>
+                <a:ext cx="1614545" cy="215444"/>
+              </a:xfrm>
+              <a:prstGeom prst="rect">
+                <a:avLst/>
+              </a:prstGeom>
+              <a:noFill/>
+            </p:spPr>
+            <p:txBody>
+              <a:bodyPr wrap="none" rtlCol="0">
+                <a:spAutoFit/>
+              </a:bodyPr>
+              <a:lstStyle/>
+              <a:p>
+                <a:r>
+                  <a:rPr lang="en-US" sz="800" dirty="0">
+                    <a:latin typeface="Helvetica" pitchFamily="2" charset="0"/>
+                  </a:rPr>
+                  <a:t>NW Oklahoma Complex (2018)</a:t>
+                </a:r>
+              </a:p>
+            </p:txBody>
+          </p:sp>
+          <p:sp>
+            <p:nvSpPr>
+              <p:cNvPr id="10" name="TextBox 9">
+                <a:extLst>
+                  <a:ext uri="{FF2B5EF4-FFF2-40B4-BE49-F238E27FC236}">
+                    <a16:creationId xmlns:a16="http://schemas.microsoft.com/office/drawing/2014/main" id="{413D147E-D9B5-61F9-3F25-03A300601330}"/>
+                  </a:ext>
+                </a:extLst>
+              </p:cNvPr>
+              <p:cNvSpPr txBox="1"/>
+              <p:nvPr/>
+            </p:nvSpPr>
+            <p:spPr>
+              <a:xfrm>
+                <a:off x="2586456" y="3688419"/>
+                <a:ext cx="1101584" cy="215444"/>
+              </a:xfrm>
+              <a:prstGeom prst="rect">
+                <a:avLst/>
+              </a:prstGeom>
+              <a:noFill/>
+            </p:spPr>
+            <p:txBody>
+              <a:bodyPr wrap="none" rtlCol="0">
+                <a:spAutoFit/>
+              </a:bodyPr>
+              <a:lstStyle/>
+              <a:p>
+                <a:r>
+                  <a:rPr lang="en-US" sz="800" dirty="0">
+                    <a:latin typeface="Helvetica" pitchFamily="2" charset="0"/>
+                  </a:rPr>
+                  <a:t>Cold Springs (2020)</a:t>
+                </a:r>
+              </a:p>
+            </p:txBody>
+          </p:sp>
+          <p:sp>
+            <p:nvSpPr>
+              <p:cNvPr id="12" name="TextBox 11">
+                <a:extLst>
+                  <a:ext uri="{FF2B5EF4-FFF2-40B4-BE49-F238E27FC236}">
+                    <a16:creationId xmlns:a16="http://schemas.microsoft.com/office/drawing/2014/main" id="{5D5D6216-993E-C5B7-13E4-C96EE9587A7C}"/>
+                  </a:ext>
+                </a:extLst>
+              </p:cNvPr>
+              <p:cNvSpPr txBox="1"/>
+              <p:nvPr/>
+            </p:nvSpPr>
+            <p:spPr>
+              <a:xfrm>
+                <a:off x="4360948" y="3697257"/>
+                <a:ext cx="1295547" cy="215444"/>
+              </a:xfrm>
+              <a:prstGeom prst="rect">
+                <a:avLst/>
+              </a:prstGeom>
+              <a:noFill/>
+            </p:spPr>
+            <p:txBody>
+              <a:bodyPr wrap="none" rtlCol="0">
+                <a:spAutoFit/>
+              </a:bodyPr>
+              <a:lstStyle/>
+              <a:p>
+                <a:r>
+                  <a:rPr lang="en-US" sz="800" dirty="0">
+                    <a:latin typeface="Helvetica" pitchFamily="2" charset="0"/>
+                  </a:rPr>
+                  <a:t>Witch-</a:t>
+                </a:r>
+                <a:r>
+                  <a:rPr lang="en-US" sz="800" dirty="0" err="1">
+                    <a:latin typeface="Helvetica" pitchFamily="2" charset="0"/>
+                  </a:rPr>
+                  <a:t>Poomacha</a:t>
+                </a:r>
+                <a:r>
+                  <a:rPr lang="en-US" sz="800" dirty="0">
+                    <a:latin typeface="Helvetica" pitchFamily="2" charset="0"/>
+                  </a:rPr>
+                  <a:t> (2007)</a:t>
+                </a:r>
+              </a:p>
+            </p:txBody>
+          </p:sp>
+          <p:pic>
+            <p:nvPicPr>
+              <p:cNvPr id="16" name="Picture 15" descr="A map of the united states&#10;&#10;Description automatically generated">
+                <a:extLst>
+                  <a:ext uri="{FF2B5EF4-FFF2-40B4-BE49-F238E27FC236}">
+                    <a16:creationId xmlns:a16="http://schemas.microsoft.com/office/drawing/2014/main" id="{42C9D3E6-33CC-F32E-2BE6-EA36E3C9667D}"/>
+                  </a:ext>
+                </a:extLst>
+              </p:cNvPr>
+              <p:cNvPicPr>
+                <a:picLocks noChangeAspect="1"/>
+              </p:cNvPicPr>
+              <p:nvPr/>
+            </p:nvPicPr>
+            <p:blipFill>
+              <a:blip r:embed="rId3"/>
+              <a:stretch>
+                <a:fillRect/>
+              </a:stretch>
+            </p:blipFill>
+            <p:spPr>
+              <a:xfrm>
+                <a:off x="219749" y="6232469"/>
+                <a:ext cx="1533415" cy="1038944"/>
+              </a:xfrm>
+              <a:prstGeom prst="rect">
+                <a:avLst/>
+              </a:prstGeom>
+            </p:spPr>
+          </p:pic>
+          <p:pic>
+            <p:nvPicPr>
+              <p:cNvPr id="11" name="Picture 10" descr="A red and black image of a person&#10;&#10;Description automatically generated">
+                <a:extLst>
+                  <a:ext uri="{FF2B5EF4-FFF2-40B4-BE49-F238E27FC236}">
+                    <a16:creationId xmlns:a16="http://schemas.microsoft.com/office/drawing/2014/main" id="{37BF7B02-6A9A-7447-AB4F-6F4460D8DE07}"/>
+                  </a:ext>
+                </a:extLst>
+              </p:cNvPr>
+              <p:cNvPicPr>
+                <a:picLocks noChangeAspect="1"/>
+              </p:cNvPicPr>
+              <p:nvPr/>
+            </p:nvPicPr>
+            <p:blipFill>
+              <a:blip r:embed="rId4"/>
+              <a:stretch>
+                <a:fillRect/>
+              </a:stretch>
+            </p:blipFill>
+            <p:spPr>
+              <a:xfrm>
+                <a:off x="-731902" y="3948484"/>
+                <a:ext cx="3685759" cy="2278980"/>
+              </a:xfrm>
+              <a:prstGeom prst="rect">
+                <a:avLst/>
+              </a:prstGeom>
+            </p:spPr>
+          </p:pic>
+          <p:pic>
+            <p:nvPicPr>
+              <p:cNvPr id="13" name="Picture 12" descr="A bar with numbers and a red line&#10;&#10;Description automatically generated with medium confidence">
+                <a:extLst>
+                  <a:ext uri="{FF2B5EF4-FFF2-40B4-BE49-F238E27FC236}">
+                    <a16:creationId xmlns:a16="http://schemas.microsoft.com/office/drawing/2014/main" id="{042CB577-A4A4-7E38-9B36-16C8B17C4964}"/>
+                  </a:ext>
+                </a:extLst>
+              </p:cNvPr>
+              <p:cNvPicPr>
+                <a:picLocks noChangeAspect="1"/>
+              </p:cNvPicPr>
+              <p:nvPr/>
+            </p:nvPicPr>
+            <p:blipFill>
+              <a:blip r:embed="rId5"/>
+              <a:stretch>
+                <a:fillRect/>
+              </a:stretch>
+            </p:blipFill>
+            <p:spPr>
+              <a:xfrm>
+                <a:off x="1890349" y="6540301"/>
+                <a:ext cx="2349500" cy="546100"/>
+              </a:xfrm>
+              <a:prstGeom prst="rect">
+                <a:avLst/>
+              </a:prstGeom>
+            </p:spPr>
+          </p:pic>
+          <p:pic>
+            <p:nvPicPr>
+              <p:cNvPr id="15" name="Picture 14">
+                <a:extLst>
+                  <a:ext uri="{FF2B5EF4-FFF2-40B4-BE49-F238E27FC236}">
+                    <a16:creationId xmlns:a16="http://schemas.microsoft.com/office/drawing/2014/main" id="{775DFF09-BC18-589D-94A6-B7E2AFE91C8F}"/>
+                  </a:ext>
+                </a:extLst>
+              </p:cNvPr>
+              <p:cNvPicPr>
+                <a:picLocks noChangeAspect="1"/>
+              </p:cNvPicPr>
+              <p:nvPr/>
+            </p:nvPicPr>
+            <p:blipFill>
+              <a:blip r:embed="rId6"/>
+              <a:stretch>
+                <a:fillRect/>
+              </a:stretch>
+            </p:blipFill>
+            <p:spPr>
+              <a:xfrm>
+                <a:off x="1222220" y="3936502"/>
+                <a:ext cx="3685758" cy="2278980"/>
+              </a:xfrm>
+              <a:prstGeom prst="rect">
+                <a:avLst/>
+              </a:prstGeom>
+            </p:spPr>
+          </p:pic>
+          <p:pic>
+            <p:nvPicPr>
+              <p:cNvPr id="19" name="Picture 18" descr="A close-up of a sign&#10;&#10;Description automatically generated">
+                <a:extLst>
+                  <a:ext uri="{FF2B5EF4-FFF2-40B4-BE49-F238E27FC236}">
+                    <a16:creationId xmlns:a16="http://schemas.microsoft.com/office/drawing/2014/main" id="{5191C38E-221D-CF1D-AF7A-9E7CD8E0E473}"/>
+                  </a:ext>
+                </a:extLst>
+              </p:cNvPr>
+              <p:cNvPicPr>
+                <a:picLocks noChangeAspect="1"/>
+              </p:cNvPicPr>
+              <p:nvPr/>
+            </p:nvPicPr>
+            <p:blipFill>
+              <a:blip r:embed="rId7"/>
+              <a:stretch>
+                <a:fillRect/>
+              </a:stretch>
+            </p:blipFill>
+            <p:spPr>
+              <a:xfrm>
+                <a:off x="4377034" y="6645608"/>
+                <a:ext cx="1362903" cy="335485"/>
+              </a:xfrm>
+              <a:prstGeom prst="rect">
+                <a:avLst/>
+              </a:prstGeom>
+            </p:spPr>
+          </p:pic>
+          <p:grpSp>
+            <p:nvGrpSpPr>
+              <p:cNvPr id="26" name="Group 25">
+                <a:extLst>
+                  <a:ext uri="{FF2B5EF4-FFF2-40B4-BE49-F238E27FC236}">
+                    <a16:creationId xmlns:a16="http://schemas.microsoft.com/office/drawing/2014/main" id="{288BEA6A-6616-7160-DE7E-E83EE333CF42}"/>
+                  </a:ext>
+                </a:extLst>
+              </p:cNvPr>
+              <p:cNvGrpSpPr/>
+              <p:nvPr/>
+            </p:nvGrpSpPr>
+            <p:grpSpPr>
+              <a:xfrm>
+                <a:off x="4027429" y="4086592"/>
+                <a:ext cx="760144" cy="340020"/>
+                <a:chOff x="275478" y="4101794"/>
+                <a:chExt cx="760144" cy="340020"/>
+              </a:xfrm>
+            </p:grpSpPr>
+            <p:cxnSp>
+              <p:nvCxnSpPr>
+                <p:cNvPr id="18" name="Straight Arrow Connector 17">
+                  <a:extLst>
+                    <a:ext uri="{FF2B5EF4-FFF2-40B4-BE49-F238E27FC236}">
+                      <a16:creationId xmlns:a16="http://schemas.microsoft.com/office/drawing/2014/main" id="{FB0BCBDA-D990-B1FE-8068-D156F677FA80}"/>
+                    </a:ext>
+                  </a:extLst>
+                </p:cNvPr>
+                <p:cNvCxnSpPr/>
+                <p:nvPr/>
+              </p:nvCxnSpPr>
+              <p:spPr>
+                <a:xfrm flipH="1">
+                  <a:off x="378737" y="4317238"/>
+                  <a:ext cx="161365" cy="107577"/>
+                </a:xfrm>
+                <a:prstGeom prst="straightConnector1">
+                  <a:avLst/>
+                </a:prstGeom>
+                <a:ln w="12700">
+                  <a:tailEnd type="triangle"/>
+                </a:ln>
+              </p:spPr>
+              <p:style>
+                <a:lnRef idx="1">
+                  <a:schemeClr val="dk1"/>
+                </a:lnRef>
+                <a:fillRef idx="0">
+                  <a:schemeClr val="dk1"/>
+                </a:fillRef>
+                <a:effectRef idx="0">
+                  <a:schemeClr val="dk1"/>
+                </a:effectRef>
+                <a:fontRef idx="minor">
+                  <a:schemeClr val="tx1"/>
+                </a:fontRef>
+              </p:style>
+            </p:cxnSp>
+            <p:sp>
+              <p:nvSpPr>
+                <p:cNvPr id="20" name="TextBox 19">
+                  <a:extLst>
+                    <a:ext uri="{FF2B5EF4-FFF2-40B4-BE49-F238E27FC236}">
+                      <a16:creationId xmlns:a16="http://schemas.microsoft.com/office/drawing/2014/main" id="{8E1F1EAB-3406-CF4B-79EF-47B1942CED47}"/>
+                    </a:ext>
+                  </a:extLst>
+                </p:cNvPr>
+                <p:cNvSpPr txBox="1"/>
+                <p:nvPr/>
+              </p:nvSpPr>
+              <p:spPr>
+                <a:xfrm>
+                  <a:off x="275478" y="4101794"/>
+                  <a:ext cx="760144" cy="215444"/>
+                </a:xfrm>
+                <a:prstGeom prst="rect">
+                  <a:avLst/>
+                </a:prstGeom>
+                <a:noFill/>
+              </p:spPr>
+              <p:txBody>
+                <a:bodyPr wrap="none" rtlCol="0">
+                  <a:spAutoFit/>
+                </a:bodyPr>
+                <a:lstStyle/>
+                <a:p>
+                  <a:r>
+                    <a:rPr lang="en-US" sz="800" dirty="0"/>
+                    <a:t>San Diego, CA</a:t>
+                  </a:r>
+                </a:p>
+              </p:txBody>
+            </p:sp>
+            <p:sp>
+              <p:nvSpPr>
+                <p:cNvPr id="21" name="TextBox 20">
+                  <a:extLst>
+                    <a:ext uri="{FF2B5EF4-FFF2-40B4-BE49-F238E27FC236}">
+                      <a16:creationId xmlns:a16="http://schemas.microsoft.com/office/drawing/2014/main" id="{EDE9353A-DB6D-405A-EAB9-ADCB782DD9F9}"/>
+                    </a:ext>
+                  </a:extLst>
+                </p:cNvPr>
+                <p:cNvSpPr txBox="1"/>
+                <p:nvPr/>
+              </p:nvSpPr>
+              <p:spPr>
+                <a:xfrm>
+                  <a:off x="475839" y="4241759"/>
+                  <a:ext cx="393056" cy="200055"/>
+                </a:xfrm>
+                <a:prstGeom prst="rect">
+                  <a:avLst/>
+                </a:prstGeom>
+                <a:noFill/>
+              </p:spPr>
+              <p:txBody>
+                <a:bodyPr wrap="none" rtlCol="0">
+                  <a:spAutoFit/>
+                </a:bodyPr>
+                <a:lstStyle/>
+                <a:p>
+                  <a:r>
+                    <a:rPr lang="en-US" sz="700" dirty="0"/>
+                    <a:t>50Km</a:t>
+                  </a:r>
+                </a:p>
+              </p:txBody>
+            </p:sp>
+          </p:grpSp>
+          <p:grpSp>
+            <p:nvGrpSpPr>
+              <p:cNvPr id="33" name="Group 32">
+                <a:extLst>
+                  <a:ext uri="{FF2B5EF4-FFF2-40B4-BE49-F238E27FC236}">
+                    <a16:creationId xmlns:a16="http://schemas.microsoft.com/office/drawing/2014/main" id="{3C6082F4-2EBA-36BB-A899-7A2102587A79}"/>
+                  </a:ext>
+                </a:extLst>
+              </p:cNvPr>
+              <p:cNvGrpSpPr/>
+              <p:nvPr/>
+            </p:nvGrpSpPr>
+            <p:grpSpPr>
+              <a:xfrm>
+                <a:off x="129208" y="4081416"/>
+                <a:ext cx="821059" cy="340020"/>
+                <a:chOff x="213570" y="4244574"/>
+                <a:chExt cx="821059" cy="340020"/>
+              </a:xfrm>
+            </p:grpSpPr>
+            <p:cxnSp>
+              <p:nvCxnSpPr>
+                <p:cNvPr id="28" name="Straight Arrow Connector 27">
+                  <a:extLst>
+                    <a:ext uri="{FF2B5EF4-FFF2-40B4-BE49-F238E27FC236}">
+                      <a16:creationId xmlns:a16="http://schemas.microsoft.com/office/drawing/2014/main" id="{D03DDD88-5847-AAC6-DED8-F8A6C796AF61}"/>
+                    </a:ext>
+                  </a:extLst>
+                </p:cNvPr>
+                <p:cNvCxnSpPr>
+                  <a:cxnSpLocks/>
+                </p:cNvCxnSpPr>
+                <p:nvPr/>
+              </p:nvCxnSpPr>
+              <p:spPr>
+                <a:xfrm>
+                  <a:off x="758758" y="4460018"/>
+                  <a:ext cx="132671" cy="90356"/>
+                </a:xfrm>
+                <a:prstGeom prst="straightConnector1">
+                  <a:avLst/>
+                </a:prstGeom>
+                <a:ln w="12700">
+                  <a:tailEnd type="triangle"/>
+                </a:ln>
+              </p:spPr>
+              <p:style>
+                <a:lnRef idx="1">
+                  <a:schemeClr val="dk1"/>
+                </a:lnRef>
+                <a:fillRef idx="0">
+                  <a:schemeClr val="dk1"/>
+                </a:fillRef>
+                <a:effectRef idx="0">
+                  <a:schemeClr val="dk1"/>
+                </a:effectRef>
+                <a:fontRef idx="minor">
+                  <a:schemeClr val="tx1"/>
+                </a:fontRef>
+              </p:style>
+            </p:cxnSp>
+            <p:sp>
+              <p:nvSpPr>
+                <p:cNvPr id="29" name="TextBox 28">
+                  <a:extLst>
+                    <a:ext uri="{FF2B5EF4-FFF2-40B4-BE49-F238E27FC236}">
+                      <a16:creationId xmlns:a16="http://schemas.microsoft.com/office/drawing/2014/main" id="{2A8429D0-769E-9AC0-A68C-49C2DBF10383}"/>
+                    </a:ext>
+                  </a:extLst>
+                </p:cNvPr>
+                <p:cNvSpPr txBox="1"/>
+                <p:nvPr/>
+              </p:nvSpPr>
+              <p:spPr>
+                <a:xfrm>
+                  <a:off x="213570" y="4244574"/>
+                  <a:ext cx="821059" cy="215444"/>
+                </a:xfrm>
+                <a:prstGeom prst="rect">
+                  <a:avLst/>
+                </a:prstGeom>
+                <a:noFill/>
+              </p:spPr>
+              <p:txBody>
+                <a:bodyPr wrap="none" rtlCol="0">
+                  <a:spAutoFit/>
+                </a:bodyPr>
+                <a:lstStyle/>
+                <a:p>
+                  <a:r>
+                    <a:rPr lang="en-US" sz="800" dirty="0"/>
+                    <a:t>Woodward, OK</a:t>
+                  </a:r>
+                </a:p>
+              </p:txBody>
+            </p:sp>
+            <p:sp>
+              <p:nvSpPr>
+                <p:cNvPr id="30" name="TextBox 29">
+                  <a:extLst>
+                    <a:ext uri="{FF2B5EF4-FFF2-40B4-BE49-F238E27FC236}">
+                      <a16:creationId xmlns:a16="http://schemas.microsoft.com/office/drawing/2014/main" id="{14372BC4-84D9-8E52-1E1D-B3CF8846D71F}"/>
+                    </a:ext>
+                  </a:extLst>
+                </p:cNvPr>
+                <p:cNvSpPr txBox="1"/>
+                <p:nvPr/>
+              </p:nvSpPr>
+              <p:spPr>
+                <a:xfrm>
+                  <a:off x="413931" y="4384539"/>
+                  <a:ext cx="393056" cy="200055"/>
+                </a:xfrm>
+                <a:prstGeom prst="rect">
+                  <a:avLst/>
+                </a:prstGeom>
+                <a:noFill/>
+              </p:spPr>
+              <p:txBody>
+                <a:bodyPr wrap="none" rtlCol="0">
+                  <a:spAutoFit/>
+                </a:bodyPr>
+                <a:lstStyle/>
+                <a:p>
+                  <a:r>
+                    <a:rPr lang="en-US" sz="700" dirty="0"/>
+                    <a:t>40Km</a:t>
+                  </a:r>
+                </a:p>
+              </p:txBody>
+            </p:sp>
+          </p:grpSp>
+          <p:cxnSp>
+            <p:nvCxnSpPr>
+              <p:cNvPr id="35" name="Straight Arrow Connector 34">
+                <a:extLst>
+                  <a:ext uri="{FF2B5EF4-FFF2-40B4-BE49-F238E27FC236}">
+                    <a16:creationId xmlns:a16="http://schemas.microsoft.com/office/drawing/2014/main" id="{44AC5393-F568-C12C-412A-5C49BF15DEED}"/>
+                  </a:ext>
+                </a:extLst>
+              </p:cNvPr>
+              <p:cNvCxnSpPr>
+                <a:cxnSpLocks/>
+              </p:cNvCxnSpPr>
+              <p:nvPr/>
+            </p:nvCxnSpPr>
+            <p:spPr>
+              <a:xfrm flipH="1">
+                <a:off x="2392762" y="4273421"/>
+                <a:ext cx="69166" cy="168353"/>
+              </a:xfrm>
+              <a:prstGeom prst="straightConnector1">
+                <a:avLst/>
+              </a:prstGeom>
+              <a:ln w="12700">
+                <a:tailEnd type="triangle"/>
+              </a:ln>
+            </p:spPr>
+            <p:style>
+              <a:lnRef idx="1">
+                <a:schemeClr val="dk1"/>
+              </a:lnRef>
+              <a:fillRef idx="0">
+                <a:schemeClr val="dk1"/>
+              </a:fillRef>
+              <a:effectRef idx="0">
+                <a:schemeClr val="dk1"/>
+              </a:effectRef>
+              <a:fontRef idx="minor">
+                <a:schemeClr val="tx1"/>
+              </a:fontRef>
+            </p:style>
+          </p:cxnSp>
+          <p:sp>
+            <p:nvSpPr>
+              <p:cNvPr id="36" name="TextBox 35">
+                <a:extLst>
+                  <a:ext uri="{FF2B5EF4-FFF2-40B4-BE49-F238E27FC236}">
+                    <a16:creationId xmlns:a16="http://schemas.microsoft.com/office/drawing/2014/main" id="{E5004386-CD0B-2A44-4818-D29DD5F693B4}"/>
+                  </a:ext>
+                </a:extLst>
+              </p:cNvPr>
+              <p:cNvSpPr txBox="1"/>
+              <p:nvPr/>
+            </p:nvSpPr>
+            <p:spPr>
+              <a:xfrm>
+                <a:off x="2179209" y="4081416"/>
+                <a:ext cx="864339" cy="215444"/>
+              </a:xfrm>
+              <a:prstGeom prst="rect">
+                <a:avLst/>
+              </a:prstGeom>
+              <a:noFill/>
+            </p:spPr>
+            <p:txBody>
+              <a:bodyPr wrap="none" rtlCol="0">
+                <a:spAutoFit/>
+              </a:bodyPr>
+              <a:lstStyle/>
+              <a:p>
+                <a:r>
+                  <a:rPr lang="en-US" sz="800" dirty="0"/>
+                  <a:t>Wenatchee, WA</a:t>
+                </a:r>
+              </a:p>
+            </p:txBody>
+          </p:sp>
+          <p:sp>
+            <p:nvSpPr>
+              <p:cNvPr id="37" name="TextBox 36">
+                <a:extLst>
+                  <a:ext uri="{FF2B5EF4-FFF2-40B4-BE49-F238E27FC236}">
+                    <a16:creationId xmlns:a16="http://schemas.microsoft.com/office/drawing/2014/main" id="{4CF4CC54-8B09-8C34-1A7A-B2528D5BAA05}"/>
+                  </a:ext>
+                </a:extLst>
+              </p:cNvPr>
+              <p:cNvSpPr txBox="1"/>
+              <p:nvPr/>
+            </p:nvSpPr>
+            <p:spPr>
+              <a:xfrm>
+                <a:off x="2398043" y="4208861"/>
+                <a:ext cx="437940" cy="200055"/>
+              </a:xfrm>
+              <a:prstGeom prst="rect">
+                <a:avLst/>
+              </a:prstGeom>
+              <a:noFill/>
+            </p:spPr>
+            <p:txBody>
+              <a:bodyPr wrap="none" rtlCol="0">
+                <a:spAutoFit/>
+              </a:bodyPr>
+              <a:lstStyle/>
+              <a:p>
+                <a:r>
+                  <a:rPr lang="en-US" sz="700" dirty="0"/>
+                  <a:t>100Km</a:t>
+                </a:r>
+              </a:p>
+            </p:txBody>
+          </p:sp>
+        </p:grpSp>
         <p:pic>
           <p:nvPicPr>
-            <p:cNvPr id="5" name="Picture 4" descr="A map of the united states with different colored dots&#10;&#10;Description automatically generated">
+            <p:cNvPr id="44" name="Picture 43" descr="A red and white cloud&#10;&#10;Description automatically generated with medium confidence">
               <a:extLst>
                 <a:ext uri="{FF2B5EF4-FFF2-40B4-BE49-F238E27FC236}">
-                  <a16:creationId xmlns:a16="http://schemas.microsoft.com/office/drawing/2014/main" id="{39E164EF-881E-0794-1307-6EEFF0FFBAB1}"/>
+                  <a16:creationId xmlns:a16="http://schemas.microsoft.com/office/drawing/2014/main" id="{0656A5FB-22E0-B700-6170-56C48F6B7964}"/>
                 </a:ext>
               </a:extLst>
             </p:cNvPr>
@@ -3001,165 +4711,15 @@
             <p:nvPr/>
           </p:nvPicPr>
           <p:blipFill>
-            <a:blip r:embed="rId2"/>
+            <a:blip r:embed="rId8"/>
             <a:stretch>
               <a:fillRect/>
             </a:stretch>
           </p:blipFill>
           <p:spPr>
             <a:xfrm>
-              <a:off x="111567" y="0"/>
-              <a:ext cx="6566516" cy="4060212"/>
-            </a:xfrm>
-            <a:prstGeom prst="rect">
-              <a:avLst/>
-            </a:prstGeom>
-          </p:spPr>
-        </p:pic>
-        <p:pic>
-          <p:nvPicPr>
-            <p:cNvPr id="11" name="Picture 10" descr="A red and black image of a person&#10;&#10;Description automatically generated">
-              <a:extLst>
-                <a:ext uri="{FF2B5EF4-FFF2-40B4-BE49-F238E27FC236}">
-                  <a16:creationId xmlns:a16="http://schemas.microsoft.com/office/drawing/2014/main" id="{37BF7B02-6A9A-7447-AB4F-6F4460D8DE07}"/>
-                </a:ext>
-              </a:extLst>
-            </p:cNvPr>
-            <p:cNvPicPr>
-              <a:picLocks noChangeAspect="1"/>
-            </p:cNvPicPr>
-            <p:nvPr/>
-          </p:nvPicPr>
-          <p:blipFill>
-            <a:blip r:embed="rId3"/>
-            <a:stretch>
-              <a:fillRect/>
-            </a:stretch>
-          </p:blipFill>
-          <p:spPr>
-            <a:xfrm>
-              <a:off x="-627148" y="4386180"/>
-              <a:ext cx="3685759" cy="2278980"/>
-            </a:xfrm>
-            <a:prstGeom prst="rect">
-              <a:avLst/>
-            </a:prstGeom>
-          </p:spPr>
-        </p:pic>
-        <p:pic>
-          <p:nvPicPr>
-            <p:cNvPr id="13" name="Picture 12" descr="A bar with numbers and a red line&#10;&#10;Description automatically generated with medium confidence">
-              <a:extLst>
-                <a:ext uri="{FF2B5EF4-FFF2-40B4-BE49-F238E27FC236}">
-                  <a16:creationId xmlns:a16="http://schemas.microsoft.com/office/drawing/2014/main" id="{042CB577-A4A4-7E38-9B36-16C8B17C4964}"/>
-                </a:ext>
-              </a:extLst>
-            </p:cNvPr>
-            <p:cNvPicPr>
-              <a:picLocks noChangeAspect="1"/>
-            </p:cNvPicPr>
-            <p:nvPr/>
-          </p:nvPicPr>
-          <p:blipFill>
-            <a:blip r:embed="rId4"/>
-            <a:stretch>
-              <a:fillRect/>
-            </a:stretch>
-          </p:blipFill>
-          <p:spPr>
-            <a:xfrm>
-              <a:off x="2358423" y="6699652"/>
-              <a:ext cx="2349500" cy="546100"/>
-            </a:xfrm>
-            <a:prstGeom prst="rect">
-              <a:avLst/>
-            </a:prstGeom>
-          </p:spPr>
-        </p:pic>
-        <p:pic>
-          <p:nvPicPr>
-            <p:cNvPr id="15" name="Picture 14">
-              <a:extLst>
-                <a:ext uri="{FF2B5EF4-FFF2-40B4-BE49-F238E27FC236}">
-                  <a16:creationId xmlns:a16="http://schemas.microsoft.com/office/drawing/2014/main" id="{775DFF09-BC18-589D-94A6-B7E2AFE91C8F}"/>
-                </a:ext>
-              </a:extLst>
-            </p:cNvPr>
-            <p:cNvPicPr>
-              <a:picLocks noChangeAspect="1"/>
-            </p:cNvPicPr>
-            <p:nvPr/>
-          </p:nvPicPr>
-          <p:blipFill>
-            <a:blip r:embed="rId5"/>
-            <a:stretch>
-              <a:fillRect/>
-            </a:stretch>
-          </p:blipFill>
-          <p:spPr>
-            <a:xfrm>
-              <a:off x="1586121" y="4351688"/>
-              <a:ext cx="3685758" cy="2278980"/>
-            </a:xfrm>
-            <a:prstGeom prst="rect">
-              <a:avLst/>
-            </a:prstGeom>
-          </p:spPr>
-        </p:pic>
-        <p:pic>
-          <p:nvPicPr>
-            <p:cNvPr id="19" name="Picture 18" descr="A close-up of a sign&#10;&#10;Description automatically generated">
-              <a:extLst>
-                <a:ext uri="{FF2B5EF4-FFF2-40B4-BE49-F238E27FC236}">
-                  <a16:creationId xmlns:a16="http://schemas.microsoft.com/office/drawing/2014/main" id="{5191C38E-221D-CF1D-AF7A-9E7CD8E0E473}"/>
-                </a:ext>
-              </a:extLst>
-            </p:cNvPr>
-            <p:cNvPicPr>
-              <a:picLocks noChangeAspect="1"/>
-            </p:cNvPicPr>
-            <p:nvPr/>
-          </p:nvPicPr>
-          <p:blipFill>
-            <a:blip r:embed="rId6"/>
-            <a:stretch>
-              <a:fillRect/>
-            </a:stretch>
-          </p:blipFill>
-          <p:spPr>
-            <a:xfrm>
-              <a:off x="5237704" y="6874593"/>
-              <a:ext cx="1222581" cy="300944"/>
-            </a:xfrm>
-            <a:prstGeom prst="rect">
-              <a:avLst/>
-            </a:prstGeom>
-          </p:spPr>
-        </p:pic>
-        <p:pic>
-          <p:nvPicPr>
-            <p:cNvPr id="22" name="Picture 21" descr="A red and white cloud&#10;&#10;Description automatically generated with medium confidence">
-              <a:extLst>
-                <a:ext uri="{FF2B5EF4-FFF2-40B4-BE49-F238E27FC236}">
-                  <a16:creationId xmlns:a16="http://schemas.microsoft.com/office/drawing/2014/main" id="{E2BBE999-9A8C-E3E5-EE6D-08A81B7ECDBA}"/>
-                </a:ext>
-              </a:extLst>
-            </p:cNvPr>
-            <p:cNvPicPr>
-              <a:picLocks noChangeAspect="1"/>
-            </p:cNvPicPr>
-            <p:nvPr/>
-          </p:nvPicPr>
-          <p:blipFill>
-            <a:blip r:embed="rId7"/>
-            <a:stretch>
-              <a:fillRect/>
-            </a:stretch>
-          </p:blipFill>
-          <p:spPr>
-            <a:xfrm>
-              <a:off x="3198709" y="3993712"/>
-              <a:ext cx="4483822" cy="2772440"/>
+              <a:off x="2794656" y="3728472"/>
+              <a:ext cx="4226644" cy="2613421"/>
             </a:xfrm>
             <a:prstGeom prst="rect">
               <a:avLst/>

</xml_diff>